<commit_message>
pT partitions for the topTagger
</commit_message>
<xml_diff>
--- a/Weekly Meetings/HEP_Weekly_8July2020.pptx
+++ b/Weekly Meetings/HEP_Weekly_8July2020.pptx
@@ -6,21 +6,18 @@
     <p:sldMasterId id="2147483661" r:id="rId2"/>
   </p:sldMasterIdLst>
   <p:notesMasterIdLst>
-    <p:notesMasterId r:id="rId12"/>
+    <p:notesMasterId r:id="rId9"/>
   </p:notesMasterIdLst>
   <p:handoutMasterIdLst>
-    <p:handoutMasterId r:id="rId13"/>
+    <p:handoutMasterId r:id="rId10"/>
   </p:handoutMasterIdLst>
   <p:sldIdLst>
     <p:sldId id="256" r:id="rId3"/>
     <p:sldId id="344" r:id="rId4"/>
     <p:sldId id="507" r:id="rId5"/>
-    <p:sldId id="519" r:id="rId6"/>
-    <p:sldId id="537" r:id="rId7"/>
-    <p:sldId id="538" r:id="rId8"/>
-    <p:sldId id="536" r:id="rId9"/>
-    <p:sldId id="525" r:id="rId10"/>
-    <p:sldId id="535" r:id="rId11"/>
+    <p:sldId id="536" r:id="rId6"/>
+    <p:sldId id="525" r:id="rId7"/>
+    <p:sldId id="535" r:id="rId8"/>
   </p:sldIdLst>
   <p:sldSz cx="12192000" cy="6858000"/>
   <p:notesSz cx="6858000" cy="9144000"/>
@@ -212,7 +209,7 @@
           <a:p>
             <a:fld id="{EC97F6CE-C9BA-5B44-AF0F-C73B1C17650F}" type="datetime1">
               <a:rPr lang="en-US" smtClean="0"/>
-              <a:t>7/7/20</a:t>
+              <a:t>7/8/20</a:t>
             </a:fld>
             <a:endParaRPr lang="en-GB"/>
           </a:p>
@@ -418,7 +415,7 @@
           <a:p>
             <a:fld id="{7F9D4A26-E586-E648-884B-C9B1EA03133F}" type="datetime1">
               <a:rPr lang="en-US" smtClean="0"/>
-              <a:t>7/7/20</a:t>
+              <a:t>7/8/20</a:t>
             </a:fld>
             <a:endParaRPr lang="en-GB"/>
           </a:p>
@@ -752,7 +749,7 @@
           <a:p>
             <a:fld id="{33D9703A-F6B0-E34C-B7F9-5A8864FF4F07}" type="datetime1">
               <a:rPr lang="en-US" smtClean="0"/>
-              <a:t>7/7/20</a:t>
+              <a:t>7/8/20</a:t>
             </a:fld>
             <a:endParaRPr lang="en-GB"/>
           </a:p>
@@ -1020,7 +1017,7 @@
           <a:p>
             <a:fld id="{DC51A3BE-CA11-4547-A39A-766971096B34}" type="datetime1">
               <a:rPr lang="en-US" smtClean="0"/>
-              <a:t>7/7/20</a:t>
+              <a:t>7/8/20</a:t>
             </a:fld>
             <a:endParaRPr lang="en-US" dirty="0"/>
           </a:p>
@@ -1227,7 +1224,7 @@
           <a:p>
             <a:fld id="{42B2CF9A-A7BF-1245-99D9-4054301C36E0}" type="datetime1">
               <a:rPr lang="en-US" smtClean="0"/>
-              <a:t>7/7/20</a:t>
+              <a:t>7/8/20</a:t>
             </a:fld>
             <a:endParaRPr lang="en-US" dirty="0"/>
           </a:p>
@@ -1482,7 +1479,7 @@
           <a:p>
             <a:fld id="{F88F3968-5050-1740-9AB7-A06844E87E5F}" type="datetime1">
               <a:rPr lang="en-US" smtClean="0"/>
-              <a:t>7/7/20</a:t>
+              <a:t>7/8/20</a:t>
             </a:fld>
             <a:endParaRPr lang="en-US" dirty="0"/>
           </a:p>
@@ -1673,7 +1670,7 @@
           <a:p>
             <a:fld id="{6A19A844-E33A-B644-A0FB-7455E93D924C}" type="datetime1">
               <a:rPr lang="en-US" smtClean="0"/>
-              <a:t>7/7/20</a:t>
+              <a:t>7/8/20</a:t>
             </a:fld>
             <a:endParaRPr lang="en-GB"/>
           </a:p>
@@ -1847,7 +1844,7 @@
           <a:p>
             <a:fld id="{F61E92BF-DA59-B546-88AE-9835521A3798}" type="datetime1">
               <a:rPr lang="en-US" smtClean="0"/>
-              <a:t>7/7/20</a:t>
+              <a:t>7/8/20</a:t>
             </a:fld>
             <a:endParaRPr lang="en-GB"/>
           </a:p>
@@ -2097,7 +2094,7 @@
           <a:p>
             <a:fld id="{61C78CAC-926A-EF4D-9608-460C3A301243}" type="datetime1">
               <a:rPr lang="en-US" smtClean="0"/>
-              <a:t>7/7/20</a:t>
+              <a:t>7/8/20</a:t>
             </a:fld>
             <a:endParaRPr lang="en-GB"/>
           </a:p>
@@ -2333,7 +2330,7 @@
           <a:p>
             <a:fld id="{32675A6D-6B9B-6546-A3DC-004E809EED54}" type="datetime1">
               <a:rPr lang="en-US" smtClean="0"/>
-              <a:t>7/7/20</a:t>
+              <a:t>7/8/20</a:t>
             </a:fld>
             <a:endParaRPr lang="en-GB"/>
           </a:p>
@@ -2704,7 +2701,7 @@
           <a:p>
             <a:fld id="{55D89806-B328-B147-9EC9-15D0307996ED}" type="datetime1">
               <a:rPr lang="en-US" smtClean="0"/>
-              <a:t>7/7/20</a:t>
+              <a:t>7/8/20</a:t>
             </a:fld>
             <a:endParaRPr lang="en-GB"/>
           </a:p>
@@ -2826,7 +2823,7 @@
           <a:p>
             <a:fld id="{702FE0D6-14B8-A94B-B441-7BA984189CE2}" type="datetime1">
               <a:rPr lang="en-US" smtClean="0"/>
-              <a:t>7/7/20</a:t>
+              <a:t>7/8/20</a:t>
             </a:fld>
             <a:endParaRPr lang="en-GB"/>
           </a:p>
@@ -2925,7 +2922,7 @@
           <a:p>
             <a:fld id="{4C294EA8-7AEB-3247-9A81-8483D03B0462}" type="datetime1">
               <a:rPr lang="en-US" smtClean="0"/>
-              <a:t>7/7/20</a:t>
+              <a:t>7/8/20</a:t>
             </a:fld>
             <a:endParaRPr lang="en-GB"/>
           </a:p>
@@ -3206,7 +3203,7 @@
           <a:p>
             <a:fld id="{D72E9315-386E-6846-8498-4330F1BBFC0A}" type="datetime1">
               <a:rPr lang="en-US" smtClean="0"/>
-              <a:t>7/7/20</a:t>
+              <a:t>7/8/20</a:t>
             </a:fld>
             <a:endParaRPr lang="en-GB"/>
           </a:p>
@@ -3362,7 +3359,7 @@
           <a:p>
             <a:fld id="{0E394EB9-E681-C34A-89D4-D81E4C62EA5B}" type="datetime1">
               <a:rPr lang="en-US" smtClean="0"/>
-              <a:t>7/7/20</a:t>
+              <a:t>7/8/20</a:t>
             </a:fld>
             <a:endParaRPr lang="en-US" dirty="0"/>
           </a:p>
@@ -3643,7 +3640,7 @@
           <a:p>
             <a:fld id="{E220BF5D-E794-2B42-91EC-2A3B4450069D}" type="datetime1">
               <a:rPr lang="en-US" smtClean="0"/>
-              <a:t>7/7/20</a:t>
+              <a:t>7/8/20</a:t>
             </a:fld>
             <a:endParaRPr lang="en-GB"/>
           </a:p>
@@ -3817,7 +3814,7 @@
           <a:p>
             <a:fld id="{BA4C039E-7082-7D42-AA91-9FF3EF6ADB5B}" type="datetime1">
               <a:rPr lang="en-US" smtClean="0"/>
-              <a:t>7/7/20</a:t>
+              <a:t>7/8/20</a:t>
             </a:fld>
             <a:endParaRPr lang="en-GB"/>
           </a:p>
@@ -4001,7 +3998,7 @@
           <a:p>
             <a:fld id="{2817B3FE-3894-A848-8D78-14007FB2FF94}" type="datetime1">
               <a:rPr lang="en-US" smtClean="0"/>
-              <a:t>7/7/20</a:t>
+              <a:t>7/8/20</a:t>
             </a:fld>
             <a:endParaRPr lang="en-GB"/>
           </a:p>
@@ -4348,7 +4345,7 @@
           <a:p>
             <a:fld id="{2DEEC64B-3E48-2F44-A6A9-A1C06A2C021E}" type="datetime1">
               <a:rPr lang="en-US" smtClean="0"/>
-              <a:t>7/7/20</a:t>
+              <a:t>7/8/20</a:t>
             </a:fld>
             <a:endParaRPr lang="en-US" dirty="0"/>
           </a:p>
@@ -4622,7 +4619,7 @@
           <a:p>
             <a:fld id="{61E195D8-183A-7F4D-8D17-8ADC90214B8A}" type="datetime1">
               <a:rPr lang="en-US" smtClean="0"/>
-              <a:t>7/7/20</a:t>
+              <a:t>7/8/20</a:t>
             </a:fld>
             <a:endParaRPr lang="en-US" dirty="0"/>
           </a:p>
@@ -5000,7 +4997,7 @@
           <a:p>
             <a:fld id="{0DD0A991-48AE-1D43-8113-23F8EAF6681B}" type="datetime1">
               <a:rPr lang="en-US" smtClean="0"/>
-              <a:t>7/7/20</a:t>
+              <a:t>7/8/20</a:t>
             </a:fld>
             <a:endParaRPr lang="en-US" dirty="0"/>
           </a:p>
@@ -5117,7 +5114,7 @@
           <a:p>
             <a:fld id="{DC12579A-EC7F-EB4A-BC5C-80733D051D29}" type="datetime1">
               <a:rPr lang="en-US" smtClean="0"/>
-              <a:t>7/7/20</a:t>
+              <a:t>7/8/20</a:t>
             </a:fld>
             <a:endParaRPr lang="en-US" dirty="0"/>
           </a:p>
@@ -5287,7 +5284,7 @@
           <a:p>
             <a:fld id="{669454CD-6DAB-7942-9B1D-8F3E2B882464}" type="datetime1">
               <a:rPr lang="en-US" smtClean="0"/>
-              <a:t>7/7/20</a:t>
+              <a:t>7/8/20</a:t>
             </a:fld>
             <a:endParaRPr lang="en-US" dirty="0"/>
           </a:p>
@@ -5671,7 +5668,7 @@
           <a:p>
             <a:fld id="{BD2CAD36-D42B-D445-A707-AA59905C7768}" type="datetime1">
               <a:rPr lang="en-US" smtClean="0"/>
-              <a:t>7/7/20</a:t>
+              <a:t>7/8/20</a:t>
             </a:fld>
             <a:endParaRPr lang="en-US" dirty="0"/>
           </a:p>
@@ -6053,7 +6050,7 @@
           <a:p>
             <a:fld id="{2D1D63B8-BB32-E649-92D4-94351543394C}" type="datetime1">
               <a:rPr lang="en-US" smtClean="0"/>
-              <a:t>7/7/20</a:t>
+              <a:t>7/8/20</a:t>
             </a:fld>
             <a:endParaRPr lang="en-US" dirty="0"/>
           </a:p>
@@ -6339,7 +6336,7 @@
           <a:p>
             <a:fld id="{FD02AE22-A9EA-FE42-BAB8-AD1D7606FF2E}" type="datetime1">
               <a:rPr lang="en-US" smtClean="0"/>
-              <a:t>7/7/20</a:t>
+              <a:t>7/8/20</a:t>
             </a:fld>
             <a:endParaRPr lang="en-US" dirty="0"/>
           </a:p>
@@ -7029,7 +7026,7 @@
           <a:p>
             <a:fld id="{307A731C-B4EF-644F-8FDB-2EBA3EC9415A}" type="datetime1">
               <a:rPr lang="en-US" smtClean="0"/>
-              <a:t>7/7/20</a:t>
+              <a:t>7/8/20</a:t>
             </a:fld>
             <a:endParaRPr lang="en-GB"/>
           </a:p>
@@ -7629,7 +7626,7 @@
           <a:p>
             <a:fld id="{37E2C1DD-94AF-5B41-A54A-0C8426B7BC1A}" type="datetime1">
               <a:rPr lang="en-US" smtClean="0"/>
-              <a:t>7/7/20</a:t>
+              <a:t>7/8/20</a:t>
             </a:fld>
             <a:endParaRPr lang="en-US" dirty="0"/>
           </a:p>
@@ -7711,120 +7708,679 @@
           </a:p>
         </p:txBody>
       </p:sp>
-      <p:sp>
-        <p:nvSpPr>
-          <p:cNvPr id="7" name="TextBox 6"/>
-          <p:cNvSpPr txBox="1"/>
-          <p:nvPr/>
-        </p:nvSpPr>
-        <p:spPr>
-          <a:xfrm>
-            <a:off x="130629" y="937162"/>
-            <a:ext cx="11771786" cy="2462213"/>
-          </a:xfrm>
-          <a:prstGeom prst="rect">
-            <a:avLst/>
-          </a:prstGeom>
-          <a:noFill/>
-        </p:spPr>
-        <p:txBody>
-          <a:bodyPr wrap="square" rtlCol="0">
-            <a:spAutoFit/>
-          </a:bodyPr>
-          <a:lstStyle/>
-          <a:p>
-            <a:pPr marL="342900" indent="-342900">
-              <a:buClr>
-                <a:schemeClr val="accent1"/>
-              </a:buClr>
-              <a:buFont typeface="Arial" panose="020B0604020202020204" pitchFamily="34" charset="0"/>
-              <a:buChar char="•"/>
-            </a:pPr>
-            <a:r>
-              <a:rPr lang="en-US" sz="2200" dirty="0"/>
-              <a:t>Top Tagger Scale Factors</a:t>
-            </a:r>
-          </a:p>
-          <a:p>
-            <a:pPr marL="800100" lvl="1" indent="-342900">
-              <a:buClr>
-                <a:schemeClr val="accent1"/>
-              </a:buClr>
-              <a:buFont typeface="Arial" panose="020B0604020202020204" pitchFamily="34" charset="0"/>
-              <a:buChar char="•"/>
-            </a:pPr>
-            <a:r>
-              <a:rPr lang="en-US" sz="2200" dirty="0"/>
-              <a:t>Tag and Probe</a:t>
-            </a:r>
-          </a:p>
-          <a:p>
-            <a:pPr marL="800100" lvl="1" indent="-342900">
-              <a:buClr>
-                <a:schemeClr val="accent1"/>
-              </a:buClr>
-              <a:buFont typeface="Arial" panose="020B0604020202020204" pitchFamily="34" charset="0"/>
-              <a:buChar char="•"/>
-            </a:pPr>
-            <a:endParaRPr lang="en-US" sz="2200" dirty="0"/>
-          </a:p>
-          <a:p>
-            <a:pPr>
-              <a:buClr>
-                <a:schemeClr val="accent1"/>
-              </a:buClr>
-            </a:pPr>
-            <a:endParaRPr lang="en-US" sz="2200" dirty="0"/>
-          </a:p>
-          <a:p>
-            <a:pPr marL="285750" indent="-285750">
-              <a:buClr>
-                <a:schemeClr val="accent1"/>
-              </a:buClr>
-              <a:buFont typeface="Arial" panose="020B0604020202020204" pitchFamily="34" charset="0"/>
-              <a:buChar char="•"/>
-            </a:pPr>
-            <a:r>
-              <a:rPr lang="en-US" sz="2200" dirty="0"/>
-              <a:t>Ultra Legacy Files</a:t>
-            </a:r>
-          </a:p>
-          <a:p>
-            <a:pPr marL="742950" lvl="1" indent="-285750">
-              <a:buClr>
-                <a:schemeClr val="accent1"/>
-              </a:buClr>
-              <a:buFont typeface="Arial" panose="020B0604020202020204" pitchFamily="34" charset="0"/>
-              <a:buChar char="•"/>
-            </a:pPr>
-            <a:r>
-              <a:rPr lang="en-US" sz="2200" dirty="0"/>
-              <a:t>Most files are there</a:t>
-            </a:r>
-          </a:p>
-          <a:p>
-            <a:pPr marL="742950" lvl="1" indent="-285750">
-              <a:buClr>
-                <a:schemeClr val="accent1"/>
-              </a:buClr>
-              <a:buFont typeface="Arial" panose="020B0604020202020204" pitchFamily="34" charset="0"/>
-              <a:buChar char="•"/>
-            </a:pPr>
-            <a:r>
-              <a:rPr lang="en-US" sz="2200" dirty="0"/>
-              <a:t>No </a:t>
-            </a:r>
-            <a:r>
-              <a:rPr lang="en-US" sz="2200" dirty="0" err="1"/>
-              <a:t>deepCSV</a:t>
-            </a:r>
-            <a:r>
-              <a:rPr lang="en-US" sz="2200" dirty="0"/>
-              <a:t> working points</a:t>
-            </a:r>
-          </a:p>
-        </p:txBody>
-      </p:sp>
+      <mc:AlternateContent xmlns:mc="http://schemas.openxmlformats.org/markup-compatibility/2006">
+        <mc:Choice xmlns:a14="http://schemas.microsoft.com/office/drawing/2010/main" Requires="a14">
+          <p:sp>
+            <p:nvSpPr>
+              <p:cNvPr id="7" name="TextBox 6"/>
+              <p:cNvSpPr txBox="1"/>
+              <p:nvPr/>
+            </p:nvSpPr>
+            <p:spPr>
+              <a:xfrm>
+                <a:off x="130629" y="937162"/>
+                <a:ext cx="11771786" cy="4765022"/>
+              </a:xfrm>
+              <a:prstGeom prst="rect">
+                <a:avLst/>
+              </a:prstGeom>
+              <a:noFill/>
+            </p:spPr>
+            <p:txBody>
+              <a:bodyPr wrap="square" rtlCol="0">
+                <a:spAutoFit/>
+              </a:bodyPr>
+              <a:lstStyle/>
+              <a:p>
+                <a:pPr marL="342900" indent="-342900">
+                  <a:buClr>
+                    <a:schemeClr val="accent1"/>
+                  </a:buClr>
+                  <a:buFont typeface="Arial" panose="020B0604020202020204" pitchFamily="34" charset="0"/>
+                  <a:buChar char="•"/>
+                </a:pPr>
+                <a:r>
+                  <a:rPr lang="en-US" sz="2200" dirty="0"/>
+                  <a:t>Top Tagger Scale Factors</a:t>
+                </a:r>
+              </a:p>
+              <a:p>
+                <a:pPr marL="800100" lvl="1" indent="-342900">
+                  <a:buClr>
+                    <a:schemeClr val="accent1"/>
+                  </a:buClr>
+                  <a:buFont typeface="Arial" panose="020B0604020202020204" pitchFamily="34" charset="0"/>
+                  <a:buChar char="•"/>
+                </a:pPr>
+                <a:r>
+                  <a:rPr lang="en-US" sz="2200" dirty="0"/>
+                  <a:t>Tag and Probe: Data and MC don’t show inconsistency </a:t>
+                </a:r>
+              </a:p>
+              <a:p>
+                <a:pPr marL="800100" lvl="1" indent="-342900">
+                  <a:buClr>
+                    <a:schemeClr val="accent1"/>
+                  </a:buClr>
+                  <a:buFont typeface="Arial" panose="020B0604020202020204" pitchFamily="34" charset="0"/>
+                  <a:buChar char="•"/>
+                </a:pPr>
+                <a:r>
+                  <a:rPr lang="en-US" sz="2200" dirty="0"/>
+                  <a:t>Data is subtracted QCD and Subdominant </a:t>
+                </a:r>
+                <a:r>
+                  <a:rPr lang="en-US" sz="2200" dirty="0" err="1"/>
+                  <a:t>bkgs</a:t>
+                </a:r>
+                <a:r>
+                  <a:rPr lang="en-US" sz="2200" dirty="0"/>
+                  <a:t> (MC) so that the data sample is pure</a:t>
+                </a:r>
+              </a:p>
+              <a:p>
+                <a:pPr lvl="1">
+                  <a:buClr>
+                    <a:schemeClr val="accent1"/>
+                  </a:buClr>
+                </a:pPr>
+                <a:endParaRPr lang="en-US" sz="2000" b="0" i="1" dirty="0">
+                  <a:solidFill>
+                    <a:srgbClr val="FF0000"/>
+                  </a:solidFill>
+                  <a:latin typeface="Cambria Math" panose="02040503050406030204" pitchFamily="18" charset="0"/>
+                </a:endParaRPr>
+              </a:p>
+              <a:p>
+                <a:pPr lvl="1">
+                  <a:buClr>
+                    <a:schemeClr val="accent1"/>
+                  </a:buClr>
+                </a:pPr>
+                <a14:m>
+                  <m:oMathPara xmlns:m="http://schemas.openxmlformats.org/officeDocument/2006/math">
+                    <m:oMathParaPr>
+                      <m:jc m:val="centerGroup"/>
+                    </m:oMathParaPr>
+                    <m:oMath xmlns:m="http://schemas.openxmlformats.org/officeDocument/2006/math">
+                      <m:r>
+                        <a:rPr lang="en-US" sz="2000" b="0" i="1" smtClean="0">
+                          <a:solidFill>
+                            <a:srgbClr val="FF0000"/>
+                          </a:solidFill>
+                          <a:latin typeface="Cambria Math" panose="02040503050406030204" pitchFamily="18" charset="0"/>
+                        </a:rPr>
+                        <m:t>𝑒𝑓𝑓𝑖𝑐𝑖𝑒𝑛𝑐𝑦</m:t>
+                      </m:r>
+                      <m:r>
+                        <a:rPr lang="en-US" sz="2000" b="0" i="1" smtClean="0">
+                          <a:solidFill>
+                            <a:srgbClr val="FF0000"/>
+                          </a:solidFill>
+                          <a:latin typeface="Cambria Math" panose="02040503050406030204" pitchFamily="18" charset="0"/>
+                        </a:rPr>
+                        <m:t>= </m:t>
+                      </m:r>
+                      <m:f>
+                        <m:fPr>
+                          <m:ctrlPr>
+                            <a:rPr lang="en-US" sz="2000" b="0" i="1" smtClean="0">
+                              <a:solidFill>
+                                <a:srgbClr val="FF0000"/>
+                              </a:solidFill>
+                              <a:latin typeface="Cambria Math" panose="02040503050406030204" pitchFamily="18" charset="0"/>
+                            </a:rPr>
+                          </m:ctrlPr>
+                        </m:fPr>
+                        <m:num>
+                          <m:r>
+                            <a:rPr lang="en-US" sz="2000" b="0" i="1" smtClean="0">
+                              <a:solidFill>
+                                <a:srgbClr val="FF0000"/>
+                              </a:solidFill>
+                              <a:latin typeface="Cambria Math" panose="02040503050406030204" pitchFamily="18" charset="0"/>
+                            </a:rPr>
+                            <m:t># (1 </m:t>
+                          </m:r>
+                          <m:r>
+                            <a:rPr lang="en-US" sz="2000" b="0" i="1" smtClean="0">
+                              <a:solidFill>
+                                <a:srgbClr val="FF0000"/>
+                              </a:solidFill>
+                              <a:latin typeface="Cambria Math" panose="02040503050406030204" pitchFamily="18" charset="0"/>
+                            </a:rPr>
+                            <m:t>𝑗𝑒𝑡</m:t>
+                          </m:r>
+                          <m:r>
+                            <a:rPr lang="en-US" sz="2000" b="0" i="1" smtClean="0">
+                              <a:solidFill>
+                                <a:srgbClr val="FF0000"/>
+                              </a:solidFill>
+                              <a:latin typeface="Cambria Math" panose="02040503050406030204" pitchFamily="18" charset="0"/>
+                            </a:rPr>
+                            <m:t> </m:t>
+                          </m:r>
+                          <m:r>
+                            <a:rPr lang="en-US" sz="2000" b="0" i="1" smtClean="0">
+                              <a:solidFill>
+                                <a:srgbClr val="FF0000"/>
+                              </a:solidFill>
+                              <a:latin typeface="Cambria Math" panose="02040503050406030204" pitchFamily="18" charset="0"/>
+                            </a:rPr>
+                            <m:t>𝑝𝑎𝑠𝑠</m:t>
+                          </m:r>
+                          <m:r>
+                            <a:rPr lang="en-US" sz="2000" b="0" i="1" smtClean="0">
+                              <a:solidFill>
+                                <a:srgbClr val="FF0000"/>
+                              </a:solidFill>
+                              <a:latin typeface="Cambria Math" panose="02040503050406030204" pitchFamily="18" charset="0"/>
+                            </a:rPr>
+                            <m:t> </m:t>
+                          </m:r>
+                          <m:r>
+                            <a:rPr lang="en-US" sz="2000" b="0" i="1" smtClean="0">
+                              <a:solidFill>
+                                <a:srgbClr val="FF0000"/>
+                              </a:solidFill>
+                              <a:latin typeface="Cambria Math" panose="02040503050406030204" pitchFamily="18" charset="0"/>
+                            </a:rPr>
+                            <m:t>𝑏𝑎𝑠𝑒𝑙𝑖𝑛𝑒</m:t>
+                          </m:r>
+                          <m:r>
+                            <a:rPr lang="en-US" sz="2000" b="0" i="1" smtClean="0">
+                              <a:solidFill>
+                                <a:srgbClr val="FF0000"/>
+                              </a:solidFill>
+                              <a:latin typeface="Cambria Math" panose="02040503050406030204" pitchFamily="18" charset="0"/>
+                            </a:rPr>
+                            <m:t>+</m:t>
+                          </m:r>
+                          <m:r>
+                            <a:rPr lang="en-US" sz="2000" b="0" i="1" smtClean="0">
+                              <a:solidFill>
+                                <a:srgbClr val="FF0000"/>
+                              </a:solidFill>
+                              <a:latin typeface="Cambria Math" panose="02040503050406030204" pitchFamily="18" charset="0"/>
+                            </a:rPr>
+                            <m:t>𝑇𝑖𝑔h𝑡</m:t>
+                          </m:r>
+                          <m:r>
+                            <a:rPr lang="en-US" sz="2000" b="0" i="1" smtClean="0">
+                              <a:solidFill>
+                                <a:srgbClr val="FF0000"/>
+                              </a:solidFill>
+                              <a:latin typeface="Cambria Math" panose="02040503050406030204" pitchFamily="18" charset="0"/>
+                            </a:rPr>
+                            <m:t> </m:t>
+                          </m:r>
+                          <m:r>
+                            <a:rPr lang="en-US" sz="2000" b="0" i="1" smtClean="0">
+                              <a:solidFill>
+                                <a:srgbClr val="FF0000"/>
+                              </a:solidFill>
+                              <a:latin typeface="Cambria Math" panose="02040503050406030204" pitchFamily="18" charset="0"/>
+                            </a:rPr>
+                            <m:t>𝑇𝑜𝑝𝑇𝑎𝑔𝑔𝑒𝑟</m:t>
+                          </m:r>
+                          <m:r>
+                            <a:rPr lang="en-US" sz="2000" b="0" i="1" smtClean="0">
+                              <a:solidFill>
+                                <a:srgbClr val="FF0000"/>
+                              </a:solidFill>
+                              <a:latin typeface="Cambria Math" panose="02040503050406030204" pitchFamily="18" charset="0"/>
+                            </a:rPr>
+                            <m:t> </m:t>
+                          </m:r>
+                          <m:r>
+                            <a:rPr lang="en-US" sz="2000" b="0" i="1" smtClean="0">
+                              <a:solidFill>
+                                <a:srgbClr val="FF0000"/>
+                              </a:solidFill>
+                              <a:latin typeface="Cambria Math" panose="02040503050406030204" pitchFamily="18" charset="0"/>
+                            </a:rPr>
+                            <m:t>𝐶𝑢𝑡</m:t>
+                          </m:r>
+                          <m:r>
+                            <a:rPr lang="en-US" sz="2000" b="0" i="1" smtClean="0">
+                              <a:solidFill>
+                                <a:srgbClr val="FF0000"/>
+                              </a:solidFill>
+                              <a:latin typeface="Cambria Math" panose="02040503050406030204" pitchFamily="18" charset="0"/>
+                            </a:rPr>
+                            <m:t> </m:t>
+                          </m:r>
+                          <m:r>
+                            <a:rPr lang="en-US" sz="2000" b="0" i="1" smtClean="0">
+                              <a:solidFill>
+                                <a:srgbClr val="FF0000"/>
+                              </a:solidFill>
+                              <a:latin typeface="Cambria Math" panose="02040503050406030204" pitchFamily="18" charset="0"/>
+                            </a:rPr>
+                            <m:t>𝐴𝑁𝐷</m:t>
+                          </m:r>
+                          <m:r>
+                            <a:rPr lang="en-US" sz="2000" b="0" i="1" smtClean="0">
+                              <a:solidFill>
+                                <a:srgbClr val="FF0000"/>
+                              </a:solidFill>
+                              <a:latin typeface="Cambria Math" panose="02040503050406030204" pitchFamily="18" charset="0"/>
+                            </a:rPr>
+                            <m:t> 1 </m:t>
+                          </m:r>
+                          <m:r>
+                            <a:rPr lang="en-US" sz="2000" b="0" i="1" smtClean="0">
+                              <a:solidFill>
+                                <a:srgbClr val="FF0000"/>
+                              </a:solidFill>
+                              <a:latin typeface="Cambria Math" panose="02040503050406030204" pitchFamily="18" charset="0"/>
+                            </a:rPr>
+                            <m:t>𝑗𝑒𝑡</m:t>
+                          </m:r>
+                          <m:r>
+                            <a:rPr lang="en-US" sz="2000" b="0" i="1" smtClean="0">
+                              <a:solidFill>
+                                <a:srgbClr val="FF0000"/>
+                              </a:solidFill>
+                              <a:latin typeface="Cambria Math" panose="02040503050406030204" pitchFamily="18" charset="0"/>
+                            </a:rPr>
+                            <m:t> </m:t>
+                          </m:r>
+                          <m:r>
+                            <a:rPr lang="en-US" sz="2000" b="0" i="1" smtClean="0">
+                              <a:solidFill>
+                                <a:srgbClr val="FF0000"/>
+                              </a:solidFill>
+                              <a:latin typeface="Cambria Math" panose="02040503050406030204" pitchFamily="18" charset="0"/>
+                            </a:rPr>
+                            <m:t>𝑝𝑎𝑠𝑠</m:t>
+                          </m:r>
+                          <m:r>
+                            <a:rPr lang="en-US" sz="2000" b="0" i="1" smtClean="0">
+                              <a:solidFill>
+                                <a:srgbClr val="FF0000"/>
+                              </a:solidFill>
+                              <a:latin typeface="Cambria Math" panose="02040503050406030204" pitchFamily="18" charset="0"/>
+                            </a:rPr>
+                            <m:t> </m:t>
+                          </m:r>
+                          <m:r>
+                            <a:rPr lang="en-US" sz="2000" b="0" i="1" smtClean="0">
+                              <a:solidFill>
+                                <a:srgbClr val="FF0000"/>
+                              </a:solidFill>
+                              <a:latin typeface="Cambria Math" panose="02040503050406030204" pitchFamily="18" charset="0"/>
+                            </a:rPr>
+                            <m:t>𝑆𝑅</m:t>
+                          </m:r>
+                          <m:r>
+                            <a:rPr lang="en-US" sz="2000" b="0" i="1" smtClean="0">
+                              <a:solidFill>
+                                <a:srgbClr val="FF0000"/>
+                              </a:solidFill>
+                              <a:latin typeface="Cambria Math" panose="02040503050406030204" pitchFamily="18" charset="0"/>
+                            </a:rPr>
+                            <m:t>)</m:t>
+                          </m:r>
+                        </m:num>
+                        <m:den>
+                          <m:r>
+                            <a:rPr lang="en-US" sz="2000" i="1">
+                              <a:solidFill>
+                                <a:srgbClr val="FF0000"/>
+                              </a:solidFill>
+                              <a:latin typeface="Cambria Math" panose="02040503050406030204" pitchFamily="18" charset="0"/>
+                            </a:rPr>
+                            <m:t># (1 </m:t>
+                          </m:r>
+                          <m:r>
+                            <a:rPr lang="en-US" sz="2000" i="1">
+                              <a:solidFill>
+                                <a:srgbClr val="FF0000"/>
+                              </a:solidFill>
+                              <a:latin typeface="Cambria Math" panose="02040503050406030204" pitchFamily="18" charset="0"/>
+                            </a:rPr>
+                            <m:t>𝑗𝑒𝑡</m:t>
+                          </m:r>
+                          <m:r>
+                            <a:rPr lang="en-US" sz="2000" i="1">
+                              <a:solidFill>
+                                <a:srgbClr val="FF0000"/>
+                              </a:solidFill>
+                              <a:latin typeface="Cambria Math" panose="02040503050406030204" pitchFamily="18" charset="0"/>
+                            </a:rPr>
+                            <m:t> </m:t>
+                          </m:r>
+                          <m:r>
+                            <a:rPr lang="en-US" sz="2000" i="1">
+                              <a:solidFill>
+                                <a:srgbClr val="FF0000"/>
+                              </a:solidFill>
+                              <a:latin typeface="Cambria Math" panose="02040503050406030204" pitchFamily="18" charset="0"/>
+                            </a:rPr>
+                            <m:t>𝑝𝑎𝑠𝑠</m:t>
+                          </m:r>
+                          <m:r>
+                            <a:rPr lang="en-US" sz="2000" i="1">
+                              <a:solidFill>
+                                <a:srgbClr val="FF0000"/>
+                              </a:solidFill>
+                              <a:latin typeface="Cambria Math" panose="02040503050406030204" pitchFamily="18" charset="0"/>
+                            </a:rPr>
+                            <m:t> </m:t>
+                          </m:r>
+                          <m:r>
+                            <a:rPr lang="en-US" sz="2000" i="1">
+                              <a:solidFill>
+                                <a:srgbClr val="FF0000"/>
+                              </a:solidFill>
+                              <a:latin typeface="Cambria Math" panose="02040503050406030204" pitchFamily="18" charset="0"/>
+                            </a:rPr>
+                            <m:t>𝑏𝑎𝑠𝑒𝑙𝑖𝑛𝑒</m:t>
+                          </m:r>
+                          <m:r>
+                            <a:rPr lang="en-US" sz="2000" i="1">
+                              <a:solidFill>
+                                <a:srgbClr val="FF0000"/>
+                              </a:solidFill>
+                              <a:latin typeface="Cambria Math" panose="02040503050406030204" pitchFamily="18" charset="0"/>
+                            </a:rPr>
+                            <m:t>+</m:t>
+                          </m:r>
+                          <m:r>
+                            <a:rPr lang="en-US" sz="2000" i="1">
+                              <a:solidFill>
+                                <a:srgbClr val="FF0000"/>
+                              </a:solidFill>
+                              <a:latin typeface="Cambria Math" panose="02040503050406030204" pitchFamily="18" charset="0"/>
+                            </a:rPr>
+                            <m:t>𝑇𝑖𝑔h𝑡</m:t>
+                          </m:r>
+                          <m:r>
+                            <a:rPr lang="en-US" sz="2000" i="1">
+                              <a:solidFill>
+                                <a:srgbClr val="FF0000"/>
+                              </a:solidFill>
+                              <a:latin typeface="Cambria Math" panose="02040503050406030204" pitchFamily="18" charset="0"/>
+                            </a:rPr>
+                            <m:t> </m:t>
+                          </m:r>
+                          <m:r>
+                            <a:rPr lang="en-US" sz="2000" i="1">
+                              <a:solidFill>
+                                <a:srgbClr val="FF0000"/>
+                              </a:solidFill>
+                              <a:latin typeface="Cambria Math" panose="02040503050406030204" pitchFamily="18" charset="0"/>
+                            </a:rPr>
+                            <m:t>𝑇𝑜𝑝𝑇𝑎𝑔𝑔𝑒𝑟</m:t>
+                          </m:r>
+                          <m:r>
+                            <a:rPr lang="en-US" sz="2000" i="1">
+                              <a:solidFill>
+                                <a:srgbClr val="FF0000"/>
+                              </a:solidFill>
+                              <a:latin typeface="Cambria Math" panose="02040503050406030204" pitchFamily="18" charset="0"/>
+                            </a:rPr>
+                            <m:t> </m:t>
+                          </m:r>
+                          <m:r>
+                            <a:rPr lang="en-US" sz="2000" i="1">
+                              <a:solidFill>
+                                <a:srgbClr val="FF0000"/>
+                              </a:solidFill>
+                              <a:latin typeface="Cambria Math" panose="02040503050406030204" pitchFamily="18" charset="0"/>
+                            </a:rPr>
+                            <m:t>𝐶𝑢𝑡</m:t>
+                          </m:r>
+                          <m:r>
+                            <a:rPr lang="en-US" sz="2000" i="1">
+                              <a:solidFill>
+                                <a:srgbClr val="FF0000"/>
+                              </a:solidFill>
+                              <a:latin typeface="Cambria Math" panose="02040503050406030204" pitchFamily="18" charset="0"/>
+                            </a:rPr>
+                            <m:t> </m:t>
+                          </m:r>
+                          <m:r>
+                            <a:rPr lang="en-US" sz="2000" i="1">
+                              <a:solidFill>
+                                <a:srgbClr val="FF0000"/>
+                              </a:solidFill>
+                              <a:latin typeface="Cambria Math" panose="02040503050406030204" pitchFamily="18" charset="0"/>
+                            </a:rPr>
+                            <m:t>𝐴𝑁𝐷</m:t>
+                          </m:r>
+                          <m:r>
+                            <a:rPr lang="en-US" sz="2000" i="1">
+                              <a:solidFill>
+                                <a:srgbClr val="FF0000"/>
+                              </a:solidFill>
+                              <a:latin typeface="Cambria Math" panose="02040503050406030204" pitchFamily="18" charset="0"/>
+                            </a:rPr>
+                            <m:t> 1 </m:t>
+                          </m:r>
+                          <m:r>
+                            <a:rPr lang="en-US" sz="2000" i="1">
+                              <a:solidFill>
+                                <a:srgbClr val="FF0000"/>
+                              </a:solidFill>
+                              <a:latin typeface="Cambria Math" panose="02040503050406030204" pitchFamily="18" charset="0"/>
+                            </a:rPr>
+                            <m:t>𝑗𝑒𝑡</m:t>
+                          </m:r>
+                          <m:r>
+                            <a:rPr lang="en-US" sz="2000" i="1">
+                              <a:solidFill>
+                                <a:srgbClr val="FF0000"/>
+                              </a:solidFill>
+                              <a:latin typeface="Cambria Math" panose="02040503050406030204" pitchFamily="18" charset="0"/>
+                            </a:rPr>
+                            <m:t> </m:t>
+                          </m:r>
+                          <m:r>
+                            <a:rPr lang="en-US" sz="2000" i="1">
+                              <a:solidFill>
+                                <a:srgbClr val="FF0000"/>
+                              </a:solidFill>
+                              <a:latin typeface="Cambria Math" panose="02040503050406030204" pitchFamily="18" charset="0"/>
+                            </a:rPr>
+                            <m:t>𝑝𝑎𝑠𝑠</m:t>
+                          </m:r>
+                          <m:r>
+                            <a:rPr lang="en-US" sz="2000" i="1">
+                              <a:solidFill>
+                                <a:srgbClr val="FF0000"/>
+                              </a:solidFill>
+                              <a:latin typeface="Cambria Math" panose="02040503050406030204" pitchFamily="18" charset="0"/>
+                            </a:rPr>
+                            <m:t> </m:t>
+                          </m:r>
+                          <m:r>
+                            <a:rPr lang="en-US" sz="2000" b="0" i="1" smtClean="0">
+                              <a:solidFill>
+                                <a:srgbClr val="FF0000"/>
+                              </a:solidFill>
+                              <a:latin typeface="Cambria Math" panose="02040503050406030204" pitchFamily="18" charset="0"/>
+                            </a:rPr>
+                            <m:t>𝑜𝑛𝑙𝑦</m:t>
+                          </m:r>
+                          <m:r>
+                            <a:rPr lang="en-US" sz="2000" b="0" i="1" smtClean="0">
+                              <a:solidFill>
+                                <a:srgbClr val="FF0000"/>
+                              </a:solidFill>
+                              <a:latin typeface="Cambria Math" panose="02040503050406030204" pitchFamily="18" charset="0"/>
+                            </a:rPr>
+                            <m:t> </m:t>
+                          </m:r>
+                          <m:r>
+                            <a:rPr lang="en-US" sz="2000" b="0" i="1" smtClean="0">
+                              <a:solidFill>
+                                <a:srgbClr val="FF0000"/>
+                              </a:solidFill>
+                              <a:latin typeface="Cambria Math" panose="02040503050406030204" pitchFamily="18" charset="0"/>
+                            </a:rPr>
+                            <m:t>𝑏𝑎𝑠𝑒𝑙𝑖𝑛𝑒</m:t>
+                          </m:r>
+                          <m:r>
+                            <a:rPr lang="en-US" sz="2000" i="1">
+                              <a:solidFill>
+                                <a:srgbClr val="FF0000"/>
+                              </a:solidFill>
+                              <a:latin typeface="Cambria Math" panose="02040503050406030204" pitchFamily="18" charset="0"/>
+                            </a:rPr>
+                            <m:t>)</m:t>
+                          </m:r>
+                        </m:den>
+                      </m:f>
+                    </m:oMath>
+                  </m:oMathPara>
+                </a14:m>
+                <a:endParaRPr lang="en-US" sz="2000" dirty="0">
+                  <a:solidFill>
+                    <a:srgbClr val="FF0000"/>
+                  </a:solidFill>
+                </a:endParaRPr>
+              </a:p>
+              <a:p>
+                <a:pPr marL="800100" lvl="1" indent="-342900">
+                  <a:buClr>
+                    <a:schemeClr val="accent1"/>
+                  </a:buClr>
+                  <a:buFont typeface="Arial" panose="020B0604020202020204" pitchFamily="34" charset="0"/>
+                  <a:buChar char="•"/>
+                </a:pPr>
+                <a:endParaRPr lang="en-US" sz="2200" dirty="0"/>
+              </a:p>
+              <a:p>
+                <a:pPr marL="342900" indent="-342900">
+                  <a:buClr>
+                    <a:schemeClr val="accent1"/>
+                  </a:buClr>
+                  <a:buFont typeface="Arial" panose="020B0604020202020204" pitchFamily="34" charset="0"/>
+                  <a:buChar char="•"/>
+                </a:pPr>
+                <a:r>
+                  <a:rPr lang="en-US" sz="2200" dirty="0"/>
+                  <a:t>Fit diagnostics:</a:t>
+                </a:r>
+              </a:p>
+              <a:p>
+                <a:pPr marL="800100" lvl="1" indent="-342900">
+                  <a:buClr>
+                    <a:schemeClr val="accent1"/>
+                  </a:buClr>
+                  <a:buFont typeface="Arial" panose="020B0604020202020204" pitchFamily="34" charset="0"/>
+                  <a:buChar char="•"/>
+                </a:pPr>
+                <a:r>
+                  <a:rPr lang="en-US" sz="2200" dirty="0"/>
+                  <a:t>Toy MC’s</a:t>
+                </a:r>
+              </a:p>
+              <a:p>
+                <a:pPr>
+                  <a:buClr>
+                    <a:schemeClr val="accent1"/>
+                  </a:buClr>
+                </a:pPr>
+                <a:endParaRPr lang="en-US" sz="2200" dirty="0"/>
+              </a:p>
+              <a:p>
+                <a:pPr marL="285750" indent="-285750">
+                  <a:buClr>
+                    <a:schemeClr val="accent1"/>
+                  </a:buClr>
+                  <a:buFont typeface="Arial" panose="020B0604020202020204" pitchFamily="34" charset="0"/>
+                  <a:buChar char="•"/>
+                </a:pPr>
+                <a:r>
+                  <a:rPr lang="en-US" sz="2200"/>
+                  <a:t>b-tagging </a:t>
+                </a:r>
+                <a:r>
+                  <a:rPr lang="en-US" sz="2200" dirty="0"/>
+                  <a:t>scale factors </a:t>
+                </a:r>
+              </a:p>
+              <a:p>
+                <a:pPr marL="285750" indent="-285750">
+                  <a:buClr>
+                    <a:schemeClr val="accent1"/>
+                  </a:buClr>
+                  <a:buFont typeface="Arial" panose="020B0604020202020204" pitchFamily="34" charset="0"/>
+                  <a:buChar char="•"/>
+                </a:pPr>
+                <a:endParaRPr lang="en-US" sz="2200" dirty="0"/>
+              </a:p>
+              <a:p>
+                <a:pPr marL="285750" indent="-285750">
+                  <a:buClr>
+                    <a:schemeClr val="accent1"/>
+                  </a:buClr>
+                  <a:buFont typeface="Arial" panose="020B0604020202020204" pitchFamily="34" charset="0"/>
+                  <a:buChar char="•"/>
+                </a:pPr>
+                <a:r>
+                  <a:rPr lang="en-US" sz="2200" dirty="0"/>
+                  <a:t>Stack of BDT inputs</a:t>
+                </a:r>
+              </a:p>
+              <a:p>
+                <a:pPr marL="742950" lvl="1" indent="-285750">
+                  <a:buClr>
+                    <a:schemeClr val="accent1"/>
+                  </a:buClr>
+                  <a:buFont typeface="Arial" panose="020B0604020202020204" pitchFamily="34" charset="0"/>
+                  <a:buChar char="•"/>
+                </a:pPr>
+                <a:r>
+                  <a:rPr lang="en-US" sz="2200" dirty="0"/>
+                  <a:t>QCD scaled to data (k-factor)</a:t>
+                </a:r>
+              </a:p>
+            </p:txBody>
+          </p:sp>
+        </mc:Choice>
+        <mc:Fallback>
+          <p:sp>
+            <p:nvSpPr>
+              <p:cNvPr id="7" name="TextBox 6"/>
+              <p:cNvSpPr txBox="1">
+                <a:spLocks noRot="1" noChangeAspect="1" noMove="1" noResize="1" noEditPoints="1" noAdjustHandles="1" noChangeArrowheads="1" noChangeShapeType="1" noTextEdit="1"/>
+              </p:cNvSpPr>
+              <p:nvPr/>
+            </p:nvSpPr>
+            <p:spPr>
+              <a:xfrm>
+                <a:off x="130629" y="937162"/>
+                <a:ext cx="11771786" cy="4765022"/>
+              </a:xfrm>
+              <a:prstGeom prst="rect">
+                <a:avLst/>
+              </a:prstGeom>
+              <a:blipFill>
+                <a:blip r:embed="rId2"/>
+                <a:stretch>
+                  <a:fillRect l="-539" t="-798" b="-1596"/>
+                </a:stretch>
+              </a:blipFill>
+            </p:spPr>
+            <p:txBody>
+              <a:bodyPr/>
+              <a:lstStyle/>
+              <a:p>
+                <a:r>
+                  <a:rPr lang="en-GR">
+                    <a:noFill/>
+                  </a:rPr>
+                  <a:t> </a:t>
+                </a:r>
+              </a:p>
+            </p:txBody>
+          </p:sp>
+        </mc:Fallback>
+      </mc:AlternateContent>
     </p:spTree>
     <p:extLst>
       <p:ext uri="{BB962C8B-B14F-4D97-AF65-F5344CB8AC3E}">
@@ -7975,7 +8531,7 @@
           <a:p>
             <a:fld id="{F7AFF6A5-F1FB-284A-BF72-2836D5A0B341}" type="datetime1">
               <a:rPr lang="en-US" smtClean="0"/>
-              <a:t>7/7/20</a:t>
+              <a:t>7/8/20</a:t>
             </a:fld>
             <a:endParaRPr lang="en-US" dirty="0"/>
           </a:p>
@@ -8984,7 +9540,15 @@
           <a:p>
             <a:r>
               <a:rPr lang="en-US" sz="2800" u="sng" dirty="0"/>
-              <a:t>Mass Fit in new Control Region (SR without any tagging requirements) </a:t>
+              <a:t>Stack of BDT input variables for leading and </a:t>
+            </a:r>
+            <a:r>
+              <a:rPr lang="en-US" sz="2800" u="sng" dirty="0" err="1"/>
+              <a:t>subleading</a:t>
+            </a:r>
+            <a:r>
+              <a:rPr lang="en-US" sz="2800" u="sng" dirty="0"/>
+              <a:t> jet (</a:t>
             </a:r>
             <a:r>
               <a:rPr lang="en-US" sz="2800" u="sng" dirty="0">
@@ -8993,6 +9557,10 @@
                 </a:solidFill>
               </a:rPr>
               <a:t>2016</a:t>
+            </a:r>
+            <a:r>
+              <a:rPr lang="en-US" sz="2800" u="sng" dirty="0"/>
+              <a:t>)</a:t>
             </a:r>
           </a:p>
         </p:txBody>
@@ -9050,7 +9618,7 @@
           <a:p>
             <a:fld id="{D52D66B2-0E0A-F441-A1DA-8039F615D612}" type="datetime1">
               <a:rPr lang="en-US" smtClean="0"/>
-              <a:t>7/7/20</a:t>
+              <a:t>7/8/20</a:t>
             </a:fld>
             <a:endParaRPr lang="en-US" dirty="0"/>
           </a:p>
@@ -9058,180 +9626,82 @@
       </p:sp>
       <p:sp>
         <p:nvSpPr>
-          <p:cNvPr id="2" name="Rectangle 1">
+          <p:cNvPr id="9" name="TextBox 8">
             <a:extLst>
               <a:ext uri="{FF2B5EF4-FFF2-40B4-BE49-F238E27FC236}">
-                <a16:creationId xmlns:a16="http://schemas.microsoft.com/office/drawing/2014/main" id="{B04BDBBC-E73B-0A43-BAD5-108F94E0F41F}"/>
+                <a16:creationId xmlns:a16="http://schemas.microsoft.com/office/drawing/2014/main" id="{94FFA463-5195-C64B-93B0-3FE5A4564439}"/>
               </a:ext>
             </a:extLst>
           </p:cNvPr>
-          <p:cNvSpPr/>
+          <p:cNvSpPr txBox="1"/>
           <p:nvPr/>
         </p:nvSpPr>
         <p:spPr>
           <a:xfrm>
-            <a:off x="6553200" y="2521059"/>
-            <a:ext cx="5551714" cy="1815882"/>
+            <a:off x="2000250" y="628817"/>
+            <a:ext cx="2857500" cy="369332"/>
           </a:xfrm>
           <a:prstGeom prst="rect">
             <a:avLst/>
           </a:prstGeom>
+          <a:noFill/>
         </p:spPr>
         <p:txBody>
-          <a:bodyPr wrap="square">
+          <a:bodyPr wrap="square" rtlCol="0">
             <a:spAutoFit/>
           </a:bodyPr>
           <a:lstStyle/>
           <a:p>
-            <a:r>
-              <a:rPr lang="en-GB" sz="1400" dirty="0">
-                <a:solidFill>
-                  <a:srgbClr val="000000"/>
-                </a:solidFill>
-                <a:latin typeface="Menlo" panose="020B0609030804020204" pitchFamily="49" charset="0"/>
-              </a:rPr>
-              <a:t>    Floating Parameter    </a:t>
-            </a:r>
-            <a:r>
-              <a:rPr lang="en-GB" sz="1400" dirty="0" err="1">
-                <a:solidFill>
-                  <a:srgbClr val="000000"/>
-                </a:solidFill>
-                <a:latin typeface="Menlo" panose="020B0609030804020204" pitchFamily="49" charset="0"/>
-              </a:rPr>
-              <a:t>FinalValue</a:t>
-            </a:r>
-            <a:r>
-              <a:rPr lang="en-GB" sz="1400" dirty="0">
-                <a:solidFill>
-                  <a:srgbClr val="000000"/>
-                </a:solidFill>
-                <a:latin typeface="Menlo" panose="020B0609030804020204" pitchFamily="49" charset="0"/>
-              </a:rPr>
-              <a:t> +/-  Error   </a:t>
-            </a:r>
-          </a:p>
-          <a:p>
-            <a:r>
-              <a:rPr lang="en-GB" sz="1400" dirty="0">
-                <a:solidFill>
-                  <a:srgbClr val="000000"/>
-                </a:solidFill>
-                <a:latin typeface="Menlo" panose="020B0609030804020204" pitchFamily="49" charset="0"/>
-              </a:rPr>
-              <a:t>  --------------------  --------------------------</a:t>
-            </a:r>
-          </a:p>
-          <a:p>
-            <a:r>
-              <a:rPr lang="en-GB" sz="1400" dirty="0">
-                <a:solidFill>
-                  <a:srgbClr val="000000"/>
-                </a:solidFill>
-                <a:latin typeface="Menlo" panose="020B0609030804020204" pitchFamily="49" charset="0"/>
-              </a:rPr>
-              <a:t>            </a:t>
-            </a:r>
-            <a:r>
-              <a:rPr lang="en-GB" sz="1400" dirty="0" err="1">
-                <a:solidFill>
-                  <a:srgbClr val="000000"/>
-                </a:solidFill>
-                <a:latin typeface="Menlo" panose="020B0609030804020204" pitchFamily="49" charset="0"/>
-              </a:rPr>
-              <a:t>kMassResol</a:t>
-            </a:r>
-            <a:r>
-              <a:rPr lang="en-GB" sz="1400" dirty="0">
-                <a:solidFill>
-                  <a:srgbClr val="000000"/>
-                </a:solidFill>
-                <a:latin typeface="Menlo" panose="020B0609030804020204" pitchFamily="49" charset="0"/>
-              </a:rPr>
-              <a:t>    9.9169e-01 +/-  5.02e-02</a:t>
-            </a:r>
-          </a:p>
-          <a:p>
-            <a:r>
-              <a:rPr lang="en-GB" sz="1400" dirty="0">
-                <a:solidFill>
-                  <a:srgbClr val="000000"/>
-                </a:solidFill>
-                <a:latin typeface="Menlo" panose="020B0609030804020204" pitchFamily="49" charset="0"/>
-              </a:rPr>
-              <a:t>            </a:t>
-            </a:r>
-            <a:r>
-              <a:rPr lang="en-GB" sz="1400" dirty="0" err="1">
-                <a:solidFill>
-                  <a:srgbClr val="000000"/>
-                </a:solidFill>
-                <a:latin typeface="Menlo" panose="020B0609030804020204" pitchFamily="49" charset="0"/>
-              </a:rPr>
-              <a:t>kMassScale</a:t>
-            </a:r>
-            <a:r>
-              <a:rPr lang="en-GB" sz="1400" dirty="0">
-                <a:solidFill>
-                  <a:srgbClr val="000000"/>
-                </a:solidFill>
-                <a:latin typeface="Menlo" panose="020B0609030804020204" pitchFamily="49" charset="0"/>
-              </a:rPr>
-              <a:t>    9.9117e-01 +/-  5.86e-03</a:t>
-            </a:r>
-          </a:p>
-          <a:p>
-            <a:r>
-              <a:rPr lang="en-GB" sz="1400" dirty="0">
-                <a:solidFill>
-                  <a:srgbClr val="000000"/>
-                </a:solidFill>
-                <a:latin typeface="Menlo" panose="020B0609030804020204" pitchFamily="49" charset="0"/>
-              </a:rPr>
-              <a:t>               kQCD_2b    7.2660e-03 +/-  5.63e-03</a:t>
-            </a:r>
-          </a:p>
-          <a:p>
-            <a:r>
-              <a:rPr lang="en-GB" sz="1400" dirty="0">
-                <a:solidFill>
-                  <a:srgbClr val="000000"/>
-                </a:solidFill>
-                <a:latin typeface="Menlo" panose="020B0609030804020204" pitchFamily="49" charset="0"/>
-              </a:rPr>
-              <a:t>            nFitBkg_2b    1.7509e+03 +/-  1.35e+03</a:t>
-            </a:r>
-          </a:p>
-          <a:p>
-            <a:r>
-              <a:rPr lang="en-GB" sz="1400" dirty="0">
-                <a:solidFill>
-                  <a:srgbClr val="000000"/>
-                </a:solidFill>
-                <a:latin typeface="Menlo" panose="020B0609030804020204" pitchFamily="49" charset="0"/>
-              </a:rPr>
-              <a:t>            nFitQCD_2b    8.6815e+03 +/-  1.54e+03</a:t>
-            </a:r>
-          </a:p>
-          <a:p>
-            <a:r>
-              <a:rPr lang="en-GB" sz="1400" dirty="0">
-                <a:solidFill>
-                  <a:srgbClr val="000000"/>
-                </a:solidFill>
-                <a:latin typeface="Menlo" panose="020B0609030804020204" pitchFamily="49" charset="0"/>
-              </a:rPr>
-              <a:t>             nFitSig2b    6.1639e+03 +/-  3.24e+02</a:t>
+            <a:pPr algn="ctr"/>
+            <a:r>
+              <a:rPr lang="en-GR" dirty="0"/>
+              <a:t>Leading</a:t>
+            </a:r>
+          </a:p>
+        </p:txBody>
+      </p:sp>
+      <p:sp>
+        <p:nvSpPr>
+          <p:cNvPr id="13" name="TextBox 12">
+            <a:extLst>
+              <a:ext uri="{FF2B5EF4-FFF2-40B4-BE49-F238E27FC236}">
+                <a16:creationId xmlns:a16="http://schemas.microsoft.com/office/drawing/2014/main" id="{4F969F21-FFD1-6241-84B2-629B9A342DED}"/>
+              </a:ext>
+            </a:extLst>
+          </p:cNvPr>
+          <p:cNvSpPr txBox="1"/>
+          <p:nvPr/>
+        </p:nvSpPr>
+        <p:spPr>
+          <a:xfrm>
+            <a:off x="7853362" y="628817"/>
+            <a:ext cx="2857500" cy="369332"/>
+          </a:xfrm>
+          <a:prstGeom prst="rect">
+            <a:avLst/>
+          </a:prstGeom>
+          <a:noFill/>
+        </p:spPr>
+        <p:txBody>
+          <a:bodyPr wrap="square" rtlCol="0">
+            <a:spAutoFit/>
+          </a:bodyPr>
+          <a:lstStyle/>
+          <a:p>
+            <a:pPr algn="ctr"/>
+            <a:r>
+              <a:rPr lang="en-GR" dirty="0"/>
+              <a:t>Sub-Leading</a:t>
             </a:r>
           </a:p>
         </p:txBody>
       </p:sp>
       <p:pic>
         <p:nvPicPr>
-          <p:cNvPr id="8" name="Picture 7">
+          <p:cNvPr id="6" name="Picture 5">
             <a:extLst>
               <a:ext uri="{FF2B5EF4-FFF2-40B4-BE49-F238E27FC236}">
-                <a16:creationId xmlns:a16="http://schemas.microsoft.com/office/drawing/2014/main" id="{C6E9912C-A688-C44E-AEA0-1EC03BF7C420}"/>
+                <a16:creationId xmlns:a16="http://schemas.microsoft.com/office/drawing/2014/main" id="{BC107AF7-114B-5744-8549-27EAFD113E63}"/>
               </a:ext>
             </a:extLst>
           </p:cNvPr>
@@ -9248,57 +9718,48 @@
         </p:blipFill>
         <p:spPr>
           <a:xfrm rot="5400000">
-            <a:off x="601134" y="0"/>
-            <a:ext cx="5829905" cy="6858000"/>
+            <a:off x="6932575" y="519674"/>
+            <a:ext cx="4311269" cy="5976747"/>
           </a:xfrm>
           <a:prstGeom prst="rect">
             <a:avLst/>
           </a:prstGeom>
         </p:spPr>
       </p:pic>
-      <p:sp>
-        <p:nvSpPr>
-          <p:cNvPr id="11" name="Rectangle 10">
+      <p:pic>
+        <p:nvPicPr>
+          <p:cNvPr id="11" name="Picture 10">
             <a:extLst>
               <a:ext uri="{FF2B5EF4-FFF2-40B4-BE49-F238E27FC236}">
-                <a16:creationId xmlns:a16="http://schemas.microsoft.com/office/drawing/2014/main" id="{0CD58FF4-54B7-BE4D-BC6A-8EAC58F285DC}"/>
+                <a16:creationId xmlns:a16="http://schemas.microsoft.com/office/drawing/2014/main" id="{7AE47FFB-DB7E-B94B-AC44-0B4C7494E809}"/>
               </a:ext>
             </a:extLst>
           </p:cNvPr>
-          <p:cNvSpPr/>
+          <p:cNvPicPr>
+            <a:picLocks noChangeAspect="1"/>
+          </p:cNvPicPr>
           <p:nvPr/>
-        </p:nvSpPr>
+        </p:nvPicPr>
+        <p:blipFill>
+          <a:blip r:embed="rId3"/>
+          <a:stretch>
+            <a:fillRect/>
+          </a:stretch>
+        </p:blipFill>
         <p:spPr>
-          <a:xfrm>
-            <a:off x="7330275" y="1572696"/>
-            <a:ext cx="4588115" cy="307777"/>
+          <a:xfrm rot="5400000">
+            <a:off x="832739" y="519674"/>
+            <a:ext cx="4311269" cy="5976747"/>
           </a:xfrm>
           <a:prstGeom prst="rect">
             <a:avLst/>
           </a:prstGeom>
         </p:spPr>
-        <p:txBody>
-          <a:bodyPr wrap="none">
-            <a:spAutoFit/>
-          </a:bodyPr>
-          <a:lstStyle/>
-          <a:p>
-            <a:r>
-              <a:rPr lang="en-GB" sz="1400" dirty="0">
-                <a:solidFill>
-                  <a:srgbClr val="00B0F0"/>
-                </a:solidFill>
-                <a:latin typeface="Menlo" panose="020B0609030804020204" pitchFamily="49" charset="0"/>
-              </a:rPr>
-              <a:t>Signal strength: r = 0.784403 ± 0.0524155</a:t>
-            </a:r>
-          </a:p>
-        </p:txBody>
-      </p:sp>
+      </p:pic>
     </p:spTree>
     <p:extLst>
       <p:ext uri="{BB962C8B-B14F-4D97-AF65-F5344CB8AC3E}">
-        <p14:creationId xmlns:p14="http://schemas.microsoft.com/office/powerpoint/2010/main" val="337597453"/>
+        <p14:creationId xmlns:p14="http://schemas.microsoft.com/office/powerpoint/2010/main" val="1427373784"/>
       </p:ext>
     </p:extLst>
   </p:cSld>
@@ -9376,7 +9837,15 @@
           <a:p>
             <a:r>
               <a:rPr lang="en-US" sz="2800" u="sng" dirty="0"/>
-              <a:t>Mass Fit in new Control Region (SR without any tagging requirements) </a:t>
+              <a:t>Stack of BDT input variables for leading and </a:t>
+            </a:r>
+            <a:r>
+              <a:rPr lang="en-US" sz="2800" u="sng" dirty="0" err="1"/>
+              <a:t>subleading</a:t>
+            </a:r>
+            <a:r>
+              <a:rPr lang="en-US" sz="2800" u="sng" dirty="0"/>
+              <a:t> jet (</a:t>
             </a:r>
             <a:r>
               <a:rPr lang="en-US" sz="2800" u="sng" dirty="0">
@@ -9388,7 +9857,7 @@
             </a:r>
             <a:r>
               <a:rPr lang="en-US" sz="2800" u="sng" dirty="0"/>
-              <a:t> </a:t>
+              <a:t>)</a:t>
             </a:r>
           </a:p>
         </p:txBody>
@@ -9446,7 +9915,7 @@
           <a:p>
             <a:fld id="{D52D66B2-0E0A-F441-A1DA-8039F615D612}" type="datetime1">
               <a:rPr lang="en-US" smtClean="0"/>
-              <a:t>7/7/20</a:t>
+              <a:t>7/8/20</a:t>
             </a:fld>
             <a:endParaRPr lang="en-US" dirty="0"/>
           </a:p>
@@ -9454,170 +9923,72 @@
       </p:sp>
       <p:sp>
         <p:nvSpPr>
-          <p:cNvPr id="2" name="Rectangle 1">
+          <p:cNvPr id="10" name="TextBox 9">
             <a:extLst>
               <a:ext uri="{FF2B5EF4-FFF2-40B4-BE49-F238E27FC236}">
-                <a16:creationId xmlns:a16="http://schemas.microsoft.com/office/drawing/2014/main" id="{9B32FF7C-A891-F543-B9E0-573126148FF6}"/>
+                <a16:creationId xmlns:a16="http://schemas.microsoft.com/office/drawing/2014/main" id="{BFA8A760-B4E2-4447-8057-6F7FE5AC7053}"/>
               </a:ext>
             </a:extLst>
           </p:cNvPr>
-          <p:cNvSpPr/>
+          <p:cNvSpPr txBox="1"/>
           <p:nvPr/>
         </p:nvSpPr>
         <p:spPr>
           <a:xfrm>
-            <a:off x="6542314" y="2521059"/>
-            <a:ext cx="5562600" cy="1815882"/>
+            <a:off x="2000250" y="628817"/>
+            <a:ext cx="2857500" cy="369332"/>
           </a:xfrm>
           <a:prstGeom prst="rect">
             <a:avLst/>
           </a:prstGeom>
+          <a:noFill/>
         </p:spPr>
         <p:txBody>
-          <a:bodyPr wrap="square">
+          <a:bodyPr wrap="square" rtlCol="0">
             <a:spAutoFit/>
           </a:bodyPr>
           <a:lstStyle/>
           <a:p>
-            <a:r>
-              <a:rPr lang="en-GB" sz="1400" dirty="0">
-                <a:solidFill>
-                  <a:srgbClr val="000000"/>
-                </a:solidFill>
-                <a:latin typeface="Menlo" panose="020B0609030804020204" pitchFamily="49" charset="0"/>
-              </a:rPr>
-              <a:t>    Floating Parameter    </a:t>
-            </a:r>
-            <a:r>
-              <a:rPr lang="en-GB" sz="1400" dirty="0" err="1">
-                <a:solidFill>
-                  <a:srgbClr val="000000"/>
-                </a:solidFill>
-                <a:latin typeface="Menlo" panose="020B0609030804020204" pitchFamily="49" charset="0"/>
-              </a:rPr>
-              <a:t>FinalValue</a:t>
-            </a:r>
-            <a:r>
-              <a:rPr lang="en-GB" sz="1400" dirty="0">
-                <a:solidFill>
-                  <a:srgbClr val="000000"/>
-                </a:solidFill>
-                <a:latin typeface="Menlo" panose="020B0609030804020204" pitchFamily="49" charset="0"/>
-              </a:rPr>
-              <a:t> +/-  Error   </a:t>
-            </a:r>
-          </a:p>
-          <a:p>
-            <a:r>
-              <a:rPr lang="en-GB" sz="1400" dirty="0">
-                <a:solidFill>
-                  <a:srgbClr val="000000"/>
-                </a:solidFill>
-                <a:latin typeface="Menlo" panose="020B0609030804020204" pitchFamily="49" charset="0"/>
-              </a:rPr>
-              <a:t>  --------------------  --------------------------</a:t>
-            </a:r>
-          </a:p>
-          <a:p>
-            <a:r>
-              <a:rPr lang="en-GB" sz="1400" dirty="0">
-                <a:solidFill>
-                  <a:srgbClr val="000000"/>
-                </a:solidFill>
-                <a:latin typeface="Menlo" panose="020B0609030804020204" pitchFamily="49" charset="0"/>
-              </a:rPr>
-              <a:t>            </a:t>
-            </a:r>
-            <a:r>
-              <a:rPr lang="en-GB" sz="1400" dirty="0" err="1">
-                <a:solidFill>
-                  <a:srgbClr val="000000"/>
-                </a:solidFill>
-                <a:latin typeface="Menlo" panose="020B0609030804020204" pitchFamily="49" charset="0"/>
-              </a:rPr>
-              <a:t>kMassResol</a:t>
-            </a:r>
-            <a:r>
-              <a:rPr lang="en-GB" sz="1400" dirty="0">
-                <a:solidFill>
-                  <a:srgbClr val="000000"/>
-                </a:solidFill>
-                <a:latin typeface="Menlo" panose="020B0609030804020204" pitchFamily="49" charset="0"/>
-              </a:rPr>
-              <a:t>    1.0822e+00 +/-  6.02e-02</a:t>
-            </a:r>
-          </a:p>
-          <a:p>
-            <a:r>
-              <a:rPr lang="en-GB" sz="1400" dirty="0">
-                <a:solidFill>
-                  <a:srgbClr val="000000"/>
-                </a:solidFill>
-                <a:latin typeface="Menlo" panose="020B0609030804020204" pitchFamily="49" charset="0"/>
-              </a:rPr>
-              <a:t>            </a:t>
-            </a:r>
-            <a:r>
-              <a:rPr lang="en-GB" sz="1400" dirty="0" err="1">
-                <a:solidFill>
-                  <a:srgbClr val="000000"/>
-                </a:solidFill>
-                <a:latin typeface="Menlo" panose="020B0609030804020204" pitchFamily="49" charset="0"/>
-              </a:rPr>
-              <a:t>kMassScale</a:t>
-            </a:r>
-            <a:r>
-              <a:rPr lang="en-GB" sz="1400" dirty="0">
-                <a:solidFill>
-                  <a:srgbClr val="000000"/>
-                </a:solidFill>
-                <a:latin typeface="Menlo" panose="020B0609030804020204" pitchFamily="49" charset="0"/>
-              </a:rPr>
-              <a:t>    9.9217e-01 +/-  4.97e-03</a:t>
-            </a:r>
-          </a:p>
-          <a:p>
-            <a:r>
-              <a:rPr lang="en-GB" sz="1400" dirty="0">
-                <a:solidFill>
-                  <a:srgbClr val="000000"/>
-                </a:solidFill>
-                <a:latin typeface="Menlo" panose="020B0609030804020204" pitchFamily="49" charset="0"/>
-              </a:rPr>
-              <a:t>               kQCD_2b    1.8117e-03 +/-  1.14e-03</a:t>
-            </a:r>
-          </a:p>
-          <a:p>
-            <a:r>
-              <a:rPr lang="en-GB" sz="1400" dirty="0">
-                <a:solidFill>
-                  <a:srgbClr val="000000"/>
-                </a:solidFill>
-                <a:latin typeface="Menlo" panose="020B0609030804020204" pitchFamily="49" charset="0"/>
-              </a:rPr>
-              <a:t>            nFitBkg_2b    4.3944e+00 +/-  7.38e+03</a:t>
-            </a:r>
-          </a:p>
-          <a:p>
-            <a:r>
-              <a:rPr lang="en-GB" sz="1400" dirty="0">
-                <a:solidFill>
-                  <a:srgbClr val="000000"/>
-                </a:solidFill>
-                <a:latin typeface="Menlo" panose="020B0609030804020204" pitchFamily="49" charset="0"/>
-              </a:rPr>
-              <a:t>            nFitQCD_2b    5.2346e+03 +/-  9.25e+02</a:t>
-            </a:r>
-          </a:p>
-          <a:p>
-            <a:r>
-              <a:rPr lang="en-GB" sz="1400" dirty="0">
-                <a:solidFill>
-                  <a:srgbClr val="000000"/>
-                </a:solidFill>
-                <a:latin typeface="Menlo" panose="020B0609030804020204" pitchFamily="49" charset="0"/>
-              </a:rPr>
-              <a:t>             nFitSig2b    3.9421e+03 +/-  5.26e+02</a:t>
+            <a:pPr algn="ctr"/>
+            <a:r>
+              <a:rPr lang="en-GR" dirty="0"/>
+              <a:t>Leading</a:t>
+            </a:r>
+          </a:p>
+        </p:txBody>
+      </p:sp>
+      <p:sp>
+        <p:nvSpPr>
+          <p:cNvPr id="11" name="TextBox 10">
+            <a:extLst>
+              <a:ext uri="{FF2B5EF4-FFF2-40B4-BE49-F238E27FC236}">
+                <a16:creationId xmlns:a16="http://schemas.microsoft.com/office/drawing/2014/main" id="{83C8C820-2264-2241-AF15-1A20E9685DC0}"/>
+              </a:ext>
+            </a:extLst>
+          </p:cNvPr>
+          <p:cNvSpPr txBox="1"/>
+          <p:nvPr/>
+        </p:nvSpPr>
+        <p:spPr>
+          <a:xfrm>
+            <a:off x="7853362" y="628817"/>
+            <a:ext cx="2857500" cy="369332"/>
+          </a:xfrm>
+          <a:prstGeom prst="rect">
+            <a:avLst/>
+          </a:prstGeom>
+          <a:noFill/>
+        </p:spPr>
+        <p:txBody>
+          <a:bodyPr wrap="square" rtlCol="0">
+            <a:spAutoFit/>
+          </a:bodyPr>
+          <a:lstStyle/>
+          <a:p>
+            <a:pPr algn="ctr"/>
+            <a:r>
+              <a:rPr lang="en-GR" dirty="0"/>
+              <a:t>Sub-Leading</a:t>
             </a:r>
           </a:p>
         </p:txBody>
@@ -9627,7 +9998,7 @@
           <p:cNvPr id="6" name="Picture 5">
             <a:extLst>
               <a:ext uri="{FF2B5EF4-FFF2-40B4-BE49-F238E27FC236}">
-                <a16:creationId xmlns:a16="http://schemas.microsoft.com/office/drawing/2014/main" id="{DE43203E-ACF1-F54A-8571-10DF5D46B76C}"/>
+                <a16:creationId xmlns:a16="http://schemas.microsoft.com/office/drawing/2014/main" id="{F4351433-406D-3248-9128-0854C5B59BF2}"/>
               </a:ext>
             </a:extLst>
           </p:cNvPr>
@@ -9644,57 +10015,48 @@
         </p:blipFill>
         <p:spPr>
           <a:xfrm rot="5400000">
-            <a:off x="514047" y="0"/>
-            <a:ext cx="5829905" cy="6858000"/>
+            <a:off x="6885196" y="440626"/>
+            <a:ext cx="4311269" cy="5976747"/>
           </a:xfrm>
           <a:prstGeom prst="rect">
             <a:avLst/>
           </a:prstGeom>
         </p:spPr>
       </p:pic>
-      <p:sp>
-        <p:nvSpPr>
-          <p:cNvPr id="8" name="Rectangle 7">
+      <p:pic>
+        <p:nvPicPr>
+          <p:cNvPr id="12" name="Picture 11">
             <a:extLst>
               <a:ext uri="{FF2B5EF4-FFF2-40B4-BE49-F238E27FC236}">
-                <a16:creationId xmlns:a16="http://schemas.microsoft.com/office/drawing/2014/main" id="{CAEEB306-E797-554D-93CA-918693A2FC57}"/>
+                <a16:creationId xmlns:a16="http://schemas.microsoft.com/office/drawing/2014/main" id="{2311A1E2-EAD1-5C46-9D4C-400AC522B42C}"/>
               </a:ext>
             </a:extLst>
           </p:cNvPr>
-          <p:cNvSpPr/>
+          <p:cNvPicPr>
+            <a:picLocks noChangeAspect="1"/>
+          </p:cNvPicPr>
           <p:nvPr/>
-        </p:nvSpPr>
+        </p:nvPicPr>
+        <p:blipFill>
+          <a:blip r:embed="rId3"/>
+          <a:stretch>
+            <a:fillRect/>
+          </a:stretch>
+        </p:blipFill>
         <p:spPr>
-          <a:xfrm>
-            <a:off x="7029556" y="1463843"/>
-            <a:ext cx="4588115" cy="307777"/>
+          <a:xfrm rot="5400000">
+            <a:off x="951992" y="440626"/>
+            <a:ext cx="4311269" cy="5976747"/>
           </a:xfrm>
           <a:prstGeom prst="rect">
             <a:avLst/>
           </a:prstGeom>
         </p:spPr>
-        <p:txBody>
-          <a:bodyPr wrap="none">
-            <a:spAutoFit/>
-          </a:bodyPr>
-          <a:lstStyle/>
-          <a:p>
-            <a:r>
-              <a:rPr lang="en-GB" sz="1400" dirty="0">
-                <a:solidFill>
-                  <a:srgbClr val="FF0000"/>
-                </a:solidFill>
-                <a:latin typeface="Menlo" panose="020B0609030804020204" pitchFamily="49" charset="0"/>
-              </a:rPr>
-              <a:t>Signal strength: r = 0.579506 ± 0.0893904</a:t>
-            </a:r>
-          </a:p>
-        </p:txBody>
-      </p:sp>
+      </p:pic>
     </p:spTree>
     <p:extLst>
       <p:ext uri="{BB962C8B-B14F-4D97-AF65-F5344CB8AC3E}">
-        <p14:creationId xmlns:p14="http://schemas.microsoft.com/office/powerpoint/2010/main" val="2581290216"/>
+        <p14:creationId xmlns:p14="http://schemas.microsoft.com/office/powerpoint/2010/main" val="1924884491"/>
       </p:ext>
     </p:extLst>
   </p:cSld>
@@ -9772,7 +10134,15 @@
           <a:p>
             <a:r>
               <a:rPr lang="en-US" sz="2800" u="sng" dirty="0"/>
-              <a:t>Mass Fit in new Control Region (SR without any tagging requirements) </a:t>
+              <a:t>Stack of BDT input variables for leading and </a:t>
+            </a:r>
+            <a:r>
+              <a:rPr lang="en-US" sz="2800" u="sng" dirty="0" err="1"/>
+              <a:t>subleading</a:t>
+            </a:r>
+            <a:r>
+              <a:rPr lang="en-US" sz="2800" u="sng" dirty="0"/>
+              <a:t> jet (</a:t>
             </a:r>
             <a:r>
               <a:rPr lang="en-US" sz="2800" u="sng" dirty="0">
@@ -9784,7 +10154,7 @@
             </a:r>
             <a:r>
               <a:rPr lang="en-US" sz="2800" u="sng" dirty="0"/>
-              <a:t> </a:t>
+              <a:t>)</a:t>
             </a:r>
           </a:p>
         </p:txBody>
@@ -9842,7 +10212,7 @@
           <a:p>
             <a:fld id="{D52D66B2-0E0A-F441-A1DA-8039F615D612}" type="datetime1">
               <a:rPr lang="en-US" smtClean="0"/>
-              <a:t>7/7/20</a:t>
+              <a:t>7/8/20</a:t>
             </a:fld>
             <a:endParaRPr lang="en-US" dirty="0"/>
           </a:p>
@@ -9850,180 +10220,82 @@
       </p:sp>
       <p:sp>
         <p:nvSpPr>
-          <p:cNvPr id="2" name="Rectangle 1">
+          <p:cNvPr id="10" name="TextBox 9">
             <a:extLst>
               <a:ext uri="{FF2B5EF4-FFF2-40B4-BE49-F238E27FC236}">
-                <a16:creationId xmlns:a16="http://schemas.microsoft.com/office/drawing/2014/main" id="{E074ADEA-1866-E94C-A951-67BD80041110}"/>
+                <a16:creationId xmlns:a16="http://schemas.microsoft.com/office/drawing/2014/main" id="{BFA8A760-B4E2-4447-8057-6F7FE5AC7053}"/>
               </a:ext>
             </a:extLst>
           </p:cNvPr>
-          <p:cNvSpPr/>
+          <p:cNvSpPr txBox="1"/>
           <p:nvPr/>
         </p:nvSpPr>
         <p:spPr>
           <a:xfrm>
-            <a:off x="6379028" y="2521059"/>
-            <a:ext cx="5725886" cy="1815882"/>
+            <a:off x="2000250" y="628817"/>
+            <a:ext cx="2857500" cy="369332"/>
           </a:xfrm>
           <a:prstGeom prst="rect">
             <a:avLst/>
           </a:prstGeom>
+          <a:noFill/>
         </p:spPr>
         <p:txBody>
-          <a:bodyPr wrap="square">
+          <a:bodyPr wrap="square" rtlCol="0">
             <a:spAutoFit/>
           </a:bodyPr>
           <a:lstStyle/>
           <a:p>
-            <a:r>
-              <a:rPr lang="en-GB" sz="1400" dirty="0">
-                <a:solidFill>
-                  <a:srgbClr val="000000"/>
-                </a:solidFill>
-                <a:latin typeface="Menlo" panose="020B0609030804020204" pitchFamily="49" charset="0"/>
-              </a:rPr>
-              <a:t>    Floating Parameter    </a:t>
-            </a:r>
-            <a:r>
-              <a:rPr lang="en-GB" sz="1400" dirty="0" err="1">
-                <a:solidFill>
-                  <a:srgbClr val="000000"/>
-                </a:solidFill>
-                <a:latin typeface="Menlo" panose="020B0609030804020204" pitchFamily="49" charset="0"/>
-              </a:rPr>
-              <a:t>FinalValue</a:t>
-            </a:r>
-            <a:r>
-              <a:rPr lang="en-GB" sz="1400" dirty="0">
-                <a:solidFill>
-                  <a:srgbClr val="000000"/>
-                </a:solidFill>
-                <a:latin typeface="Menlo" panose="020B0609030804020204" pitchFamily="49" charset="0"/>
-              </a:rPr>
-              <a:t> +/-  Error   </a:t>
-            </a:r>
-          </a:p>
-          <a:p>
-            <a:r>
-              <a:rPr lang="en-GB" sz="1400" dirty="0">
-                <a:solidFill>
-                  <a:srgbClr val="000000"/>
-                </a:solidFill>
-                <a:latin typeface="Menlo" panose="020B0609030804020204" pitchFamily="49" charset="0"/>
-              </a:rPr>
-              <a:t>  --------------------  --------------------------</a:t>
-            </a:r>
-          </a:p>
-          <a:p>
-            <a:r>
-              <a:rPr lang="en-GB" sz="1400" dirty="0">
-                <a:solidFill>
-                  <a:srgbClr val="000000"/>
-                </a:solidFill>
-                <a:latin typeface="Menlo" panose="020B0609030804020204" pitchFamily="49" charset="0"/>
-              </a:rPr>
-              <a:t>            </a:t>
-            </a:r>
-            <a:r>
-              <a:rPr lang="en-GB" sz="1400" dirty="0" err="1">
-                <a:solidFill>
-                  <a:srgbClr val="000000"/>
-                </a:solidFill>
-                <a:latin typeface="Menlo" panose="020B0609030804020204" pitchFamily="49" charset="0"/>
-              </a:rPr>
-              <a:t>kMassResol</a:t>
-            </a:r>
-            <a:r>
-              <a:rPr lang="en-GB" sz="1400" dirty="0">
-                <a:solidFill>
-                  <a:srgbClr val="000000"/>
-                </a:solidFill>
-                <a:latin typeface="Menlo" panose="020B0609030804020204" pitchFamily="49" charset="0"/>
-              </a:rPr>
-              <a:t>    1.1551e+00 +/-  5.59e-02</a:t>
-            </a:r>
-          </a:p>
-          <a:p>
-            <a:r>
-              <a:rPr lang="en-GB" sz="1400" dirty="0">
-                <a:solidFill>
-                  <a:srgbClr val="000000"/>
-                </a:solidFill>
-                <a:latin typeface="Menlo" panose="020B0609030804020204" pitchFamily="49" charset="0"/>
-              </a:rPr>
-              <a:t>            </a:t>
-            </a:r>
-            <a:r>
-              <a:rPr lang="en-GB" sz="1400" dirty="0" err="1">
-                <a:solidFill>
-                  <a:srgbClr val="000000"/>
-                </a:solidFill>
-                <a:latin typeface="Menlo" panose="020B0609030804020204" pitchFamily="49" charset="0"/>
-              </a:rPr>
-              <a:t>kMassScale</a:t>
-            </a:r>
-            <a:r>
-              <a:rPr lang="en-GB" sz="1400" dirty="0">
-                <a:solidFill>
-                  <a:srgbClr val="000000"/>
-                </a:solidFill>
-                <a:latin typeface="Menlo" panose="020B0609030804020204" pitchFamily="49" charset="0"/>
-              </a:rPr>
-              <a:t>    9.8898e-01 +/-  3.45e-03</a:t>
-            </a:r>
-          </a:p>
-          <a:p>
-            <a:r>
-              <a:rPr lang="en-GB" sz="1400" dirty="0">
-                <a:solidFill>
-                  <a:srgbClr val="000000"/>
-                </a:solidFill>
-                <a:latin typeface="Menlo" panose="020B0609030804020204" pitchFamily="49" charset="0"/>
-              </a:rPr>
-              <a:t>               kQCD_2b    4.9131e-03 +/-  1.44e-03</a:t>
-            </a:r>
-          </a:p>
-          <a:p>
-            <a:r>
-              <a:rPr lang="en-GB" sz="1400" dirty="0">
-                <a:solidFill>
-                  <a:srgbClr val="000000"/>
-                </a:solidFill>
-                <a:latin typeface="Menlo" panose="020B0609030804020204" pitchFamily="49" charset="0"/>
-              </a:rPr>
-              <a:t>            nFitBkg_2b    1.6862e-03 +/-  3.34e+02</a:t>
-            </a:r>
-          </a:p>
-          <a:p>
-            <a:r>
-              <a:rPr lang="en-GB" sz="1400" dirty="0">
-                <a:solidFill>
-                  <a:srgbClr val="000000"/>
-                </a:solidFill>
-                <a:latin typeface="Menlo" panose="020B0609030804020204" pitchFamily="49" charset="0"/>
-              </a:rPr>
-              <a:t>            nFitQCD_2b    1.2031e+04 +/-  5.52e+02</a:t>
-            </a:r>
-          </a:p>
-          <a:p>
-            <a:r>
-              <a:rPr lang="en-GB" sz="1400" dirty="0">
-                <a:solidFill>
-                  <a:srgbClr val="000000"/>
-                </a:solidFill>
-                <a:latin typeface="Menlo" panose="020B0609030804020204" pitchFamily="49" charset="0"/>
-              </a:rPr>
-              <a:t>             nFitSig2b    7.3653e+03 +/-  3.50e+02</a:t>
+            <a:pPr algn="ctr"/>
+            <a:r>
+              <a:rPr lang="en-GR" dirty="0"/>
+              <a:t>Leading</a:t>
+            </a:r>
+          </a:p>
+        </p:txBody>
+      </p:sp>
+      <p:sp>
+        <p:nvSpPr>
+          <p:cNvPr id="11" name="TextBox 10">
+            <a:extLst>
+              <a:ext uri="{FF2B5EF4-FFF2-40B4-BE49-F238E27FC236}">
+                <a16:creationId xmlns:a16="http://schemas.microsoft.com/office/drawing/2014/main" id="{83C8C820-2264-2241-AF15-1A20E9685DC0}"/>
+              </a:ext>
+            </a:extLst>
+          </p:cNvPr>
+          <p:cNvSpPr txBox="1"/>
+          <p:nvPr/>
+        </p:nvSpPr>
+        <p:spPr>
+          <a:xfrm>
+            <a:off x="7612080" y="628817"/>
+            <a:ext cx="2857500" cy="369332"/>
+          </a:xfrm>
+          <a:prstGeom prst="rect">
+            <a:avLst/>
+          </a:prstGeom>
+          <a:noFill/>
+        </p:spPr>
+        <p:txBody>
+          <a:bodyPr wrap="square" rtlCol="0">
+            <a:spAutoFit/>
+          </a:bodyPr>
+          <a:lstStyle/>
+          <a:p>
+            <a:pPr algn="ctr"/>
+            <a:r>
+              <a:rPr lang="en-GR" dirty="0"/>
+              <a:t>Sub-Leading</a:t>
             </a:r>
           </a:p>
         </p:txBody>
       </p:sp>
       <p:pic>
         <p:nvPicPr>
-          <p:cNvPr id="6" name="Picture 5">
+          <p:cNvPr id="12" name="Picture 11">
             <a:extLst>
               <a:ext uri="{FF2B5EF4-FFF2-40B4-BE49-F238E27FC236}">
-                <a16:creationId xmlns:a16="http://schemas.microsoft.com/office/drawing/2014/main" id="{EBC6DF85-4F0A-C847-9601-2BB21519DBE8}"/>
+                <a16:creationId xmlns:a16="http://schemas.microsoft.com/office/drawing/2014/main" id="{38E15AF8-E4AC-A643-874F-5EB855C5CDB0}"/>
               </a:ext>
             </a:extLst>
           </p:cNvPr>
@@ -10040,313 +10312,7 @@
         </p:blipFill>
         <p:spPr>
           <a:xfrm rot="5400000">
-            <a:off x="514047" y="0"/>
-            <a:ext cx="5829905" cy="6858000"/>
-          </a:xfrm>
-          <a:prstGeom prst="rect">
-            <a:avLst/>
-          </a:prstGeom>
-        </p:spPr>
-      </p:pic>
-      <p:sp>
-        <p:nvSpPr>
-          <p:cNvPr id="8" name="Rectangle 7">
-            <a:extLst>
-              <a:ext uri="{FF2B5EF4-FFF2-40B4-BE49-F238E27FC236}">
-                <a16:creationId xmlns:a16="http://schemas.microsoft.com/office/drawing/2014/main" id="{4CA1342B-7EE8-A140-B967-398821646358}"/>
-              </a:ext>
-            </a:extLst>
-          </p:cNvPr>
-          <p:cNvSpPr/>
-          <p:nvPr/>
-        </p:nvSpPr>
-        <p:spPr>
-          <a:xfrm>
-            <a:off x="6947913" y="1463843"/>
-            <a:ext cx="4588115" cy="307777"/>
-          </a:xfrm>
-          <a:prstGeom prst="rect">
-            <a:avLst/>
-          </a:prstGeom>
-        </p:spPr>
-        <p:txBody>
-          <a:bodyPr wrap="none">
-            <a:spAutoFit/>
-          </a:bodyPr>
-          <a:lstStyle/>
-          <a:p>
-            <a:r>
-              <a:rPr lang="en-GB" sz="1400" dirty="0">
-                <a:solidFill>
-                  <a:srgbClr val="00B050"/>
-                </a:solidFill>
-                <a:latin typeface="Menlo" panose="020B0609030804020204" pitchFamily="49" charset="0"/>
-              </a:rPr>
-              <a:t>Signal strength: r = 0.681708 ± 0.0391799</a:t>
-            </a:r>
-          </a:p>
-        </p:txBody>
-      </p:sp>
-    </p:spTree>
-    <p:extLst>
-      <p:ext uri="{BB962C8B-B14F-4D97-AF65-F5344CB8AC3E}">
-        <p14:creationId xmlns:p14="http://schemas.microsoft.com/office/powerpoint/2010/main" val="2405387726"/>
-      </p:ext>
-    </p:extLst>
-  </p:cSld>
-  <p:clrMapOvr>
-    <a:masterClrMapping/>
-  </p:clrMapOvr>
-</p:sld>
-</file>
-
-<file path=ppt/slides/slide7.xml><?xml version="1.0" encoding="utf-8"?>
-<p:sld xmlns:a="http://schemas.openxmlformats.org/drawingml/2006/main" xmlns:r="http://schemas.openxmlformats.org/officeDocument/2006/relationships" xmlns:p="http://schemas.openxmlformats.org/presentationml/2006/main">
-  <p:cSld>
-    <p:spTree>
-      <p:nvGrpSpPr>
-        <p:cNvPr id="1" name=""/>
-        <p:cNvGrpSpPr/>
-        <p:nvPr/>
-      </p:nvGrpSpPr>
-      <p:grpSpPr>
-        <a:xfrm>
-          <a:off x="0" y="0"/>
-          <a:ext cx="0" cy="0"/>
-          <a:chOff x="0" y="0"/>
-          <a:chExt cx="0" cy="0"/>
-        </a:xfrm>
-      </p:grpSpPr>
-      <p:sp>
-        <p:nvSpPr>
-          <p:cNvPr id="3" name="Footer Placeholder 2"/>
-          <p:cNvSpPr>
-            <a:spLocks noGrp="1"/>
-          </p:cNvSpPr>
-          <p:nvPr>
-            <p:ph type="ftr" sz="quarter" idx="11"/>
-          </p:nvPr>
-        </p:nvSpPr>
-        <p:spPr/>
-        <p:txBody>
-          <a:bodyPr/>
-          <a:lstStyle/>
-          <a:p>
-            <a:r>
-              <a:rPr lang="fi-FI" dirty="0"/>
-              <a:t>NTUA G. </a:t>
-            </a:r>
-            <a:r>
-              <a:rPr lang="fi-FI" dirty="0" err="1"/>
-              <a:t>Bakas</a:t>
-            </a:r>
-            <a:endParaRPr lang="en-US" dirty="0"/>
-          </a:p>
-        </p:txBody>
-      </p:sp>
-      <p:sp>
-        <p:nvSpPr>
-          <p:cNvPr id="7" name="TextBox 6"/>
-          <p:cNvSpPr txBox="1"/>
-          <p:nvPr/>
-        </p:nvSpPr>
-        <p:spPr>
-          <a:xfrm>
-            <a:off x="0" y="33090"/>
-            <a:ext cx="12104914" cy="523220"/>
-          </a:xfrm>
-          <a:prstGeom prst="rect">
-            <a:avLst/>
-          </a:prstGeom>
-          <a:noFill/>
-        </p:spPr>
-        <p:txBody>
-          <a:bodyPr wrap="square" rtlCol="0">
-            <a:spAutoFit/>
-          </a:bodyPr>
-          <a:lstStyle/>
-          <a:p>
-            <a:r>
-              <a:rPr lang="en-US" sz="2800" u="sng" dirty="0"/>
-              <a:t>Stack of BDT input variables for leading and </a:t>
-            </a:r>
-            <a:r>
-              <a:rPr lang="en-US" sz="2800" u="sng" dirty="0" err="1"/>
-              <a:t>subleading</a:t>
-            </a:r>
-            <a:r>
-              <a:rPr lang="en-US" sz="2800" u="sng" dirty="0"/>
-              <a:t> jet (</a:t>
-            </a:r>
-            <a:r>
-              <a:rPr lang="en-US" sz="2800" u="sng" dirty="0">
-                <a:solidFill>
-                  <a:srgbClr val="00B0F0"/>
-                </a:solidFill>
-              </a:rPr>
-              <a:t>2016</a:t>
-            </a:r>
-            <a:r>
-              <a:rPr lang="en-US" sz="2800" u="sng" dirty="0"/>
-              <a:t>)</a:t>
-            </a:r>
-          </a:p>
-        </p:txBody>
-      </p:sp>
-      <p:sp>
-        <p:nvSpPr>
-          <p:cNvPr id="5" name="Slide Number Placeholder 4">
-            <a:extLst>
-              <a:ext uri="{FF2B5EF4-FFF2-40B4-BE49-F238E27FC236}">
-                <a16:creationId xmlns:a16="http://schemas.microsoft.com/office/drawing/2014/main" id="{69A96869-DB60-5345-ACD9-F1C41035B064}"/>
-              </a:ext>
-            </a:extLst>
-          </p:cNvPr>
-          <p:cNvSpPr>
-            <a:spLocks noGrp="1"/>
-          </p:cNvSpPr>
-          <p:nvPr>
-            <p:ph type="sldNum" sz="quarter" idx="12"/>
-          </p:nvPr>
-        </p:nvSpPr>
-        <p:spPr/>
-        <p:txBody>
-          <a:bodyPr/>
-          <a:lstStyle/>
-          <a:p>
-            <a:fld id="{4FAB73BC-B049-4115-A692-8D63A059BFB8}" type="slidenum">
-              <a:rPr lang="en-US" smtClean="0"/>
-              <a:pPr/>
-              <a:t>7</a:t>
-            </a:fld>
-            <a:endParaRPr lang="en-US" dirty="0"/>
-          </a:p>
-        </p:txBody>
-      </p:sp>
-      <p:sp>
-        <p:nvSpPr>
-          <p:cNvPr id="24" name="Date Placeholder 23">
-            <a:extLst>
-              <a:ext uri="{FF2B5EF4-FFF2-40B4-BE49-F238E27FC236}">
-                <a16:creationId xmlns:a16="http://schemas.microsoft.com/office/drawing/2014/main" id="{056D71EF-2E89-4043-8F92-90A4D46A3E69}"/>
-              </a:ext>
-            </a:extLst>
-          </p:cNvPr>
-          <p:cNvSpPr>
-            <a:spLocks noGrp="1"/>
-          </p:cNvSpPr>
-          <p:nvPr>
-            <p:ph type="dt" sz="half" idx="10"/>
-          </p:nvPr>
-        </p:nvSpPr>
-        <p:spPr/>
-        <p:txBody>
-          <a:bodyPr/>
-          <a:lstStyle/>
-          <a:p>
-            <a:fld id="{D52D66B2-0E0A-F441-A1DA-8039F615D612}" type="datetime1">
-              <a:rPr lang="en-US" smtClean="0"/>
-              <a:t>7/7/20</a:t>
-            </a:fld>
-            <a:endParaRPr lang="en-US" dirty="0"/>
-          </a:p>
-        </p:txBody>
-      </p:sp>
-      <p:sp>
-        <p:nvSpPr>
-          <p:cNvPr id="9" name="TextBox 8">
-            <a:extLst>
-              <a:ext uri="{FF2B5EF4-FFF2-40B4-BE49-F238E27FC236}">
-                <a16:creationId xmlns:a16="http://schemas.microsoft.com/office/drawing/2014/main" id="{94FFA463-5195-C64B-93B0-3FE5A4564439}"/>
-              </a:ext>
-            </a:extLst>
-          </p:cNvPr>
-          <p:cNvSpPr txBox="1"/>
-          <p:nvPr/>
-        </p:nvSpPr>
-        <p:spPr>
-          <a:xfrm>
-            <a:off x="2000250" y="628817"/>
-            <a:ext cx="2857500" cy="369332"/>
-          </a:xfrm>
-          <a:prstGeom prst="rect">
-            <a:avLst/>
-          </a:prstGeom>
-          <a:noFill/>
-        </p:spPr>
-        <p:txBody>
-          <a:bodyPr wrap="square" rtlCol="0">
-            <a:spAutoFit/>
-          </a:bodyPr>
-          <a:lstStyle/>
-          <a:p>
-            <a:pPr algn="ctr"/>
-            <a:r>
-              <a:rPr lang="en-GR" dirty="0"/>
-              <a:t>Leading</a:t>
-            </a:r>
-          </a:p>
-        </p:txBody>
-      </p:sp>
-      <p:sp>
-        <p:nvSpPr>
-          <p:cNvPr id="13" name="TextBox 12">
-            <a:extLst>
-              <a:ext uri="{FF2B5EF4-FFF2-40B4-BE49-F238E27FC236}">
-                <a16:creationId xmlns:a16="http://schemas.microsoft.com/office/drawing/2014/main" id="{4F969F21-FFD1-6241-84B2-629B9A342DED}"/>
-              </a:ext>
-            </a:extLst>
-          </p:cNvPr>
-          <p:cNvSpPr txBox="1"/>
-          <p:nvPr/>
-        </p:nvSpPr>
-        <p:spPr>
-          <a:xfrm>
-            <a:off x="7853362" y="628817"/>
-            <a:ext cx="2857500" cy="369332"/>
-          </a:xfrm>
-          <a:prstGeom prst="rect">
-            <a:avLst/>
-          </a:prstGeom>
-          <a:noFill/>
-        </p:spPr>
-        <p:txBody>
-          <a:bodyPr wrap="square" rtlCol="0">
-            <a:spAutoFit/>
-          </a:bodyPr>
-          <a:lstStyle/>
-          <a:p>
-            <a:pPr algn="ctr"/>
-            <a:r>
-              <a:rPr lang="en-GR" dirty="0"/>
-              <a:t>Sub-Leading</a:t>
-            </a:r>
-          </a:p>
-        </p:txBody>
-      </p:sp>
-      <p:pic>
-        <p:nvPicPr>
-          <p:cNvPr id="4" name="Picture 3">
-            <a:extLst>
-              <a:ext uri="{FF2B5EF4-FFF2-40B4-BE49-F238E27FC236}">
-                <a16:creationId xmlns:a16="http://schemas.microsoft.com/office/drawing/2014/main" id="{DA16B24B-EFE5-A34B-9E03-3FF91E4B8453}"/>
-              </a:ext>
-            </a:extLst>
-          </p:cNvPr>
-          <p:cNvPicPr>
-            <a:picLocks noChangeAspect="1"/>
-          </p:cNvPicPr>
-          <p:nvPr/>
-        </p:nvPicPr>
-        <p:blipFill>
-          <a:blip r:embed="rId2"/>
-          <a:stretch>
-            <a:fillRect/>
-          </a:stretch>
-        </p:blipFill>
-        <p:spPr>
-          <a:xfrm rot="5400000">
-            <a:off x="6960906" y="440625"/>
+            <a:off x="6925581" y="440626"/>
             <a:ext cx="4311269" cy="5976747"/>
           </a:xfrm>
           <a:prstGeom prst="rect">
@@ -10356,10 +10322,10 @@
       </p:pic>
       <p:pic>
         <p:nvPicPr>
-          <p:cNvPr id="8" name="Picture 7">
+          <p:cNvPr id="15" name="Picture 14">
             <a:extLst>
               <a:ext uri="{FF2B5EF4-FFF2-40B4-BE49-F238E27FC236}">
-                <a16:creationId xmlns:a16="http://schemas.microsoft.com/office/drawing/2014/main" id="{B4B1DF64-D6D8-8B4D-9F29-7556ECCA2E93}"/>
+                <a16:creationId xmlns:a16="http://schemas.microsoft.com/office/drawing/2014/main" id="{2E7A8671-0A1F-804D-AE3C-FCBC4BE18999}"/>
               </a:ext>
             </a:extLst>
           </p:cNvPr>
@@ -10376,601 +10342,7 @@
         </p:blipFill>
         <p:spPr>
           <a:xfrm rot="5400000">
-            <a:off x="851309" y="440626"/>
-            <a:ext cx="4311269" cy="5976747"/>
-          </a:xfrm>
-          <a:prstGeom prst="rect">
-            <a:avLst/>
-          </a:prstGeom>
-        </p:spPr>
-      </p:pic>
-    </p:spTree>
-    <p:extLst>
-      <p:ext uri="{BB962C8B-B14F-4D97-AF65-F5344CB8AC3E}">
-        <p14:creationId xmlns:p14="http://schemas.microsoft.com/office/powerpoint/2010/main" val="1427373784"/>
-      </p:ext>
-    </p:extLst>
-  </p:cSld>
-  <p:clrMapOvr>
-    <a:masterClrMapping/>
-  </p:clrMapOvr>
-</p:sld>
-</file>
-
-<file path=ppt/slides/slide8.xml><?xml version="1.0" encoding="utf-8"?>
-<p:sld xmlns:a="http://schemas.openxmlformats.org/drawingml/2006/main" xmlns:r="http://schemas.openxmlformats.org/officeDocument/2006/relationships" xmlns:p="http://schemas.openxmlformats.org/presentationml/2006/main">
-  <p:cSld>
-    <p:spTree>
-      <p:nvGrpSpPr>
-        <p:cNvPr id="1" name=""/>
-        <p:cNvGrpSpPr/>
-        <p:nvPr/>
-      </p:nvGrpSpPr>
-      <p:grpSpPr>
-        <a:xfrm>
-          <a:off x="0" y="0"/>
-          <a:ext cx="0" cy="0"/>
-          <a:chOff x="0" y="0"/>
-          <a:chExt cx="0" cy="0"/>
-        </a:xfrm>
-      </p:grpSpPr>
-      <p:sp>
-        <p:nvSpPr>
-          <p:cNvPr id="3" name="Footer Placeholder 2"/>
-          <p:cNvSpPr>
-            <a:spLocks noGrp="1"/>
-          </p:cNvSpPr>
-          <p:nvPr>
-            <p:ph type="ftr" sz="quarter" idx="11"/>
-          </p:nvPr>
-        </p:nvSpPr>
-        <p:spPr/>
-        <p:txBody>
-          <a:bodyPr/>
-          <a:lstStyle/>
-          <a:p>
-            <a:r>
-              <a:rPr lang="fi-FI" dirty="0"/>
-              <a:t>NTUA G. </a:t>
-            </a:r>
-            <a:r>
-              <a:rPr lang="fi-FI" dirty="0" err="1"/>
-              <a:t>Bakas</a:t>
-            </a:r>
-            <a:endParaRPr lang="en-US" dirty="0"/>
-          </a:p>
-        </p:txBody>
-      </p:sp>
-      <p:sp>
-        <p:nvSpPr>
-          <p:cNvPr id="7" name="TextBox 6"/>
-          <p:cNvSpPr txBox="1"/>
-          <p:nvPr/>
-        </p:nvSpPr>
-        <p:spPr>
-          <a:xfrm>
-            <a:off x="0" y="33090"/>
-            <a:ext cx="12104914" cy="523220"/>
-          </a:xfrm>
-          <a:prstGeom prst="rect">
-            <a:avLst/>
-          </a:prstGeom>
-          <a:noFill/>
-        </p:spPr>
-        <p:txBody>
-          <a:bodyPr wrap="square" rtlCol="0">
-            <a:spAutoFit/>
-          </a:bodyPr>
-          <a:lstStyle/>
-          <a:p>
-            <a:r>
-              <a:rPr lang="en-US" sz="2800" u="sng" dirty="0"/>
-              <a:t>Stack of BDT input variables for leading and </a:t>
-            </a:r>
-            <a:r>
-              <a:rPr lang="en-US" sz="2800" u="sng" dirty="0" err="1"/>
-              <a:t>subleading</a:t>
-            </a:r>
-            <a:r>
-              <a:rPr lang="en-US" sz="2800" u="sng" dirty="0"/>
-              <a:t> jet (</a:t>
-            </a:r>
-            <a:r>
-              <a:rPr lang="en-US" sz="2800" u="sng" dirty="0">
-                <a:solidFill>
-                  <a:srgbClr val="FF0000"/>
-                </a:solidFill>
-              </a:rPr>
-              <a:t>2017</a:t>
-            </a:r>
-            <a:r>
-              <a:rPr lang="en-US" sz="2800" u="sng" dirty="0"/>
-              <a:t>)</a:t>
-            </a:r>
-          </a:p>
-        </p:txBody>
-      </p:sp>
-      <p:sp>
-        <p:nvSpPr>
-          <p:cNvPr id="5" name="Slide Number Placeholder 4">
-            <a:extLst>
-              <a:ext uri="{FF2B5EF4-FFF2-40B4-BE49-F238E27FC236}">
-                <a16:creationId xmlns:a16="http://schemas.microsoft.com/office/drawing/2014/main" id="{69A96869-DB60-5345-ACD9-F1C41035B064}"/>
-              </a:ext>
-            </a:extLst>
-          </p:cNvPr>
-          <p:cNvSpPr>
-            <a:spLocks noGrp="1"/>
-          </p:cNvSpPr>
-          <p:nvPr>
-            <p:ph type="sldNum" sz="quarter" idx="12"/>
-          </p:nvPr>
-        </p:nvSpPr>
-        <p:spPr/>
-        <p:txBody>
-          <a:bodyPr/>
-          <a:lstStyle/>
-          <a:p>
-            <a:fld id="{4FAB73BC-B049-4115-A692-8D63A059BFB8}" type="slidenum">
-              <a:rPr lang="en-US" smtClean="0"/>
-              <a:pPr/>
-              <a:t>8</a:t>
-            </a:fld>
-            <a:endParaRPr lang="en-US" dirty="0"/>
-          </a:p>
-        </p:txBody>
-      </p:sp>
-      <p:sp>
-        <p:nvSpPr>
-          <p:cNvPr id="24" name="Date Placeholder 23">
-            <a:extLst>
-              <a:ext uri="{FF2B5EF4-FFF2-40B4-BE49-F238E27FC236}">
-                <a16:creationId xmlns:a16="http://schemas.microsoft.com/office/drawing/2014/main" id="{056D71EF-2E89-4043-8F92-90A4D46A3E69}"/>
-              </a:ext>
-            </a:extLst>
-          </p:cNvPr>
-          <p:cNvSpPr>
-            <a:spLocks noGrp="1"/>
-          </p:cNvSpPr>
-          <p:nvPr>
-            <p:ph type="dt" sz="half" idx="10"/>
-          </p:nvPr>
-        </p:nvSpPr>
-        <p:spPr/>
-        <p:txBody>
-          <a:bodyPr/>
-          <a:lstStyle/>
-          <a:p>
-            <a:fld id="{D52D66B2-0E0A-F441-A1DA-8039F615D612}" type="datetime1">
-              <a:rPr lang="en-US" smtClean="0"/>
-              <a:t>7/7/20</a:t>
-            </a:fld>
-            <a:endParaRPr lang="en-US" dirty="0"/>
-          </a:p>
-        </p:txBody>
-      </p:sp>
-      <p:sp>
-        <p:nvSpPr>
-          <p:cNvPr id="10" name="TextBox 9">
-            <a:extLst>
-              <a:ext uri="{FF2B5EF4-FFF2-40B4-BE49-F238E27FC236}">
-                <a16:creationId xmlns:a16="http://schemas.microsoft.com/office/drawing/2014/main" id="{BFA8A760-B4E2-4447-8057-6F7FE5AC7053}"/>
-              </a:ext>
-            </a:extLst>
-          </p:cNvPr>
-          <p:cNvSpPr txBox="1"/>
-          <p:nvPr/>
-        </p:nvSpPr>
-        <p:spPr>
-          <a:xfrm>
-            <a:off x="2000250" y="628817"/>
-            <a:ext cx="2857500" cy="369332"/>
-          </a:xfrm>
-          <a:prstGeom prst="rect">
-            <a:avLst/>
-          </a:prstGeom>
-          <a:noFill/>
-        </p:spPr>
-        <p:txBody>
-          <a:bodyPr wrap="square" rtlCol="0">
-            <a:spAutoFit/>
-          </a:bodyPr>
-          <a:lstStyle/>
-          <a:p>
-            <a:pPr algn="ctr"/>
-            <a:r>
-              <a:rPr lang="en-GR" dirty="0"/>
-              <a:t>Leading</a:t>
-            </a:r>
-          </a:p>
-        </p:txBody>
-      </p:sp>
-      <p:sp>
-        <p:nvSpPr>
-          <p:cNvPr id="11" name="TextBox 10">
-            <a:extLst>
-              <a:ext uri="{FF2B5EF4-FFF2-40B4-BE49-F238E27FC236}">
-                <a16:creationId xmlns:a16="http://schemas.microsoft.com/office/drawing/2014/main" id="{83C8C820-2264-2241-AF15-1A20E9685DC0}"/>
-              </a:ext>
-            </a:extLst>
-          </p:cNvPr>
-          <p:cNvSpPr txBox="1"/>
-          <p:nvPr/>
-        </p:nvSpPr>
-        <p:spPr>
-          <a:xfrm>
-            <a:off x="7853362" y="628817"/>
-            <a:ext cx="2857500" cy="369332"/>
-          </a:xfrm>
-          <a:prstGeom prst="rect">
-            <a:avLst/>
-          </a:prstGeom>
-          <a:noFill/>
-        </p:spPr>
-        <p:txBody>
-          <a:bodyPr wrap="square" rtlCol="0">
-            <a:spAutoFit/>
-          </a:bodyPr>
-          <a:lstStyle/>
-          <a:p>
-            <a:pPr algn="ctr"/>
-            <a:r>
-              <a:rPr lang="en-GR" dirty="0"/>
-              <a:t>Sub-Leading</a:t>
-            </a:r>
-          </a:p>
-        </p:txBody>
-      </p:sp>
-      <p:pic>
-        <p:nvPicPr>
-          <p:cNvPr id="4" name="Picture 3">
-            <a:extLst>
-              <a:ext uri="{FF2B5EF4-FFF2-40B4-BE49-F238E27FC236}">
-                <a16:creationId xmlns:a16="http://schemas.microsoft.com/office/drawing/2014/main" id="{7B05ACF3-B4CB-B843-BE06-59E84182ACF2}"/>
-              </a:ext>
-            </a:extLst>
-          </p:cNvPr>
-          <p:cNvPicPr>
-            <a:picLocks noChangeAspect="1"/>
-          </p:cNvPicPr>
-          <p:nvPr/>
-        </p:nvPicPr>
-        <p:blipFill>
-          <a:blip r:embed="rId2"/>
-          <a:stretch>
-            <a:fillRect/>
-          </a:stretch>
-        </p:blipFill>
-        <p:spPr>
-          <a:xfrm rot="5400000">
-            <a:off x="6809486" y="440625"/>
-            <a:ext cx="4311269" cy="5976747"/>
-          </a:xfrm>
-          <a:prstGeom prst="rect">
-            <a:avLst/>
-          </a:prstGeom>
-        </p:spPr>
-      </p:pic>
-      <p:pic>
-        <p:nvPicPr>
-          <p:cNvPr id="8" name="Picture 7">
-            <a:extLst>
-              <a:ext uri="{FF2B5EF4-FFF2-40B4-BE49-F238E27FC236}">
-                <a16:creationId xmlns:a16="http://schemas.microsoft.com/office/drawing/2014/main" id="{DD15F878-A9E6-FC4A-AFB7-0044F8EA55D9}"/>
-              </a:ext>
-            </a:extLst>
-          </p:cNvPr>
-          <p:cNvPicPr>
-            <a:picLocks noChangeAspect="1"/>
-          </p:cNvPicPr>
-          <p:nvPr/>
-        </p:nvPicPr>
-        <p:blipFill>
-          <a:blip r:embed="rId3"/>
-          <a:stretch>
-            <a:fillRect/>
-          </a:stretch>
-        </p:blipFill>
-        <p:spPr>
-          <a:xfrm rot="5400000">
-            <a:off x="832739" y="440626"/>
-            <a:ext cx="4311269" cy="5976747"/>
-          </a:xfrm>
-          <a:prstGeom prst="rect">
-            <a:avLst/>
-          </a:prstGeom>
-        </p:spPr>
-      </p:pic>
-    </p:spTree>
-    <p:extLst>
-      <p:ext uri="{BB962C8B-B14F-4D97-AF65-F5344CB8AC3E}">
-        <p14:creationId xmlns:p14="http://schemas.microsoft.com/office/powerpoint/2010/main" val="1924884491"/>
-      </p:ext>
-    </p:extLst>
-  </p:cSld>
-  <p:clrMapOvr>
-    <a:masterClrMapping/>
-  </p:clrMapOvr>
-</p:sld>
-</file>
-
-<file path=ppt/slides/slide9.xml><?xml version="1.0" encoding="utf-8"?>
-<p:sld xmlns:a="http://schemas.openxmlformats.org/drawingml/2006/main" xmlns:r="http://schemas.openxmlformats.org/officeDocument/2006/relationships" xmlns:p="http://schemas.openxmlformats.org/presentationml/2006/main">
-  <p:cSld>
-    <p:spTree>
-      <p:nvGrpSpPr>
-        <p:cNvPr id="1" name=""/>
-        <p:cNvGrpSpPr/>
-        <p:nvPr/>
-      </p:nvGrpSpPr>
-      <p:grpSpPr>
-        <a:xfrm>
-          <a:off x="0" y="0"/>
-          <a:ext cx="0" cy="0"/>
-          <a:chOff x="0" y="0"/>
-          <a:chExt cx="0" cy="0"/>
-        </a:xfrm>
-      </p:grpSpPr>
-      <p:sp>
-        <p:nvSpPr>
-          <p:cNvPr id="3" name="Footer Placeholder 2"/>
-          <p:cNvSpPr>
-            <a:spLocks noGrp="1"/>
-          </p:cNvSpPr>
-          <p:nvPr>
-            <p:ph type="ftr" sz="quarter" idx="11"/>
-          </p:nvPr>
-        </p:nvSpPr>
-        <p:spPr/>
-        <p:txBody>
-          <a:bodyPr/>
-          <a:lstStyle/>
-          <a:p>
-            <a:r>
-              <a:rPr lang="fi-FI" dirty="0"/>
-              <a:t>NTUA G. </a:t>
-            </a:r>
-            <a:r>
-              <a:rPr lang="fi-FI" dirty="0" err="1"/>
-              <a:t>Bakas</a:t>
-            </a:r>
-            <a:endParaRPr lang="en-US" dirty="0"/>
-          </a:p>
-        </p:txBody>
-      </p:sp>
-      <p:sp>
-        <p:nvSpPr>
-          <p:cNvPr id="7" name="TextBox 6"/>
-          <p:cNvSpPr txBox="1"/>
-          <p:nvPr/>
-        </p:nvSpPr>
-        <p:spPr>
-          <a:xfrm>
-            <a:off x="0" y="33090"/>
-            <a:ext cx="12104914" cy="523220"/>
-          </a:xfrm>
-          <a:prstGeom prst="rect">
-            <a:avLst/>
-          </a:prstGeom>
-          <a:noFill/>
-        </p:spPr>
-        <p:txBody>
-          <a:bodyPr wrap="square" rtlCol="0">
-            <a:spAutoFit/>
-          </a:bodyPr>
-          <a:lstStyle/>
-          <a:p>
-            <a:r>
-              <a:rPr lang="en-US" sz="2800" u="sng" dirty="0"/>
-              <a:t>Stack of BDT input variables for leading and </a:t>
-            </a:r>
-            <a:r>
-              <a:rPr lang="en-US" sz="2800" u="sng" dirty="0" err="1"/>
-              <a:t>subleading</a:t>
-            </a:r>
-            <a:r>
-              <a:rPr lang="en-US" sz="2800" u="sng" dirty="0"/>
-              <a:t> jet (</a:t>
-            </a:r>
-            <a:r>
-              <a:rPr lang="en-US" sz="2800" u="sng" dirty="0">
-                <a:solidFill>
-                  <a:srgbClr val="00B050"/>
-                </a:solidFill>
-              </a:rPr>
-              <a:t>2018</a:t>
-            </a:r>
-            <a:r>
-              <a:rPr lang="en-US" sz="2800" u="sng" dirty="0"/>
-              <a:t>)</a:t>
-            </a:r>
-          </a:p>
-        </p:txBody>
-      </p:sp>
-      <p:sp>
-        <p:nvSpPr>
-          <p:cNvPr id="5" name="Slide Number Placeholder 4">
-            <a:extLst>
-              <a:ext uri="{FF2B5EF4-FFF2-40B4-BE49-F238E27FC236}">
-                <a16:creationId xmlns:a16="http://schemas.microsoft.com/office/drawing/2014/main" id="{69A96869-DB60-5345-ACD9-F1C41035B064}"/>
-              </a:ext>
-            </a:extLst>
-          </p:cNvPr>
-          <p:cNvSpPr>
-            <a:spLocks noGrp="1"/>
-          </p:cNvSpPr>
-          <p:nvPr>
-            <p:ph type="sldNum" sz="quarter" idx="12"/>
-          </p:nvPr>
-        </p:nvSpPr>
-        <p:spPr/>
-        <p:txBody>
-          <a:bodyPr/>
-          <a:lstStyle/>
-          <a:p>
-            <a:fld id="{4FAB73BC-B049-4115-A692-8D63A059BFB8}" type="slidenum">
-              <a:rPr lang="en-US" smtClean="0"/>
-              <a:pPr/>
-              <a:t>9</a:t>
-            </a:fld>
-            <a:endParaRPr lang="en-US" dirty="0"/>
-          </a:p>
-        </p:txBody>
-      </p:sp>
-      <p:sp>
-        <p:nvSpPr>
-          <p:cNvPr id="24" name="Date Placeholder 23">
-            <a:extLst>
-              <a:ext uri="{FF2B5EF4-FFF2-40B4-BE49-F238E27FC236}">
-                <a16:creationId xmlns:a16="http://schemas.microsoft.com/office/drawing/2014/main" id="{056D71EF-2E89-4043-8F92-90A4D46A3E69}"/>
-              </a:ext>
-            </a:extLst>
-          </p:cNvPr>
-          <p:cNvSpPr>
-            <a:spLocks noGrp="1"/>
-          </p:cNvSpPr>
-          <p:nvPr>
-            <p:ph type="dt" sz="half" idx="10"/>
-          </p:nvPr>
-        </p:nvSpPr>
-        <p:spPr/>
-        <p:txBody>
-          <a:bodyPr/>
-          <a:lstStyle/>
-          <a:p>
-            <a:fld id="{D52D66B2-0E0A-F441-A1DA-8039F615D612}" type="datetime1">
-              <a:rPr lang="en-US" smtClean="0"/>
-              <a:t>7/7/20</a:t>
-            </a:fld>
-            <a:endParaRPr lang="en-US" dirty="0"/>
-          </a:p>
-        </p:txBody>
-      </p:sp>
-      <p:sp>
-        <p:nvSpPr>
-          <p:cNvPr id="10" name="TextBox 9">
-            <a:extLst>
-              <a:ext uri="{FF2B5EF4-FFF2-40B4-BE49-F238E27FC236}">
-                <a16:creationId xmlns:a16="http://schemas.microsoft.com/office/drawing/2014/main" id="{BFA8A760-B4E2-4447-8057-6F7FE5AC7053}"/>
-              </a:ext>
-            </a:extLst>
-          </p:cNvPr>
-          <p:cNvSpPr txBox="1"/>
-          <p:nvPr/>
-        </p:nvSpPr>
-        <p:spPr>
-          <a:xfrm>
-            <a:off x="2000250" y="628817"/>
-            <a:ext cx="2857500" cy="369332"/>
-          </a:xfrm>
-          <a:prstGeom prst="rect">
-            <a:avLst/>
-          </a:prstGeom>
-          <a:noFill/>
-        </p:spPr>
-        <p:txBody>
-          <a:bodyPr wrap="square" rtlCol="0">
-            <a:spAutoFit/>
-          </a:bodyPr>
-          <a:lstStyle/>
-          <a:p>
-            <a:pPr algn="ctr"/>
-            <a:r>
-              <a:rPr lang="en-GR" dirty="0"/>
-              <a:t>Leading</a:t>
-            </a:r>
-          </a:p>
-        </p:txBody>
-      </p:sp>
-      <p:sp>
-        <p:nvSpPr>
-          <p:cNvPr id="11" name="TextBox 10">
-            <a:extLst>
-              <a:ext uri="{FF2B5EF4-FFF2-40B4-BE49-F238E27FC236}">
-                <a16:creationId xmlns:a16="http://schemas.microsoft.com/office/drawing/2014/main" id="{83C8C820-2264-2241-AF15-1A20E9685DC0}"/>
-              </a:ext>
-            </a:extLst>
-          </p:cNvPr>
-          <p:cNvSpPr txBox="1"/>
-          <p:nvPr/>
-        </p:nvSpPr>
-        <p:spPr>
-          <a:xfrm>
-            <a:off x="7612080" y="628817"/>
-            <a:ext cx="2857500" cy="369332"/>
-          </a:xfrm>
-          <a:prstGeom prst="rect">
-            <a:avLst/>
-          </a:prstGeom>
-          <a:noFill/>
-        </p:spPr>
-        <p:txBody>
-          <a:bodyPr wrap="square" rtlCol="0">
-            <a:spAutoFit/>
-          </a:bodyPr>
-          <a:lstStyle/>
-          <a:p>
-            <a:pPr algn="ctr"/>
-            <a:r>
-              <a:rPr lang="en-GR" dirty="0"/>
-              <a:t>Sub-Leading</a:t>
-            </a:r>
-          </a:p>
-        </p:txBody>
-      </p:sp>
-      <p:pic>
-        <p:nvPicPr>
-          <p:cNvPr id="14" name="Picture 13">
-            <a:extLst>
-              <a:ext uri="{FF2B5EF4-FFF2-40B4-BE49-F238E27FC236}">
-                <a16:creationId xmlns:a16="http://schemas.microsoft.com/office/drawing/2014/main" id="{7933DBEC-B27A-B745-99C7-76FEDCF5EECD}"/>
-              </a:ext>
-            </a:extLst>
-          </p:cNvPr>
-          <p:cNvPicPr>
-            <a:picLocks noChangeAspect="1"/>
-          </p:cNvPicPr>
-          <p:nvPr/>
-        </p:nvPicPr>
-        <p:blipFill>
-          <a:blip r:embed="rId2"/>
-          <a:stretch>
-            <a:fillRect/>
-          </a:stretch>
-        </p:blipFill>
-        <p:spPr>
-          <a:xfrm rot="5400000">
-            <a:off x="6885195" y="440625"/>
-            <a:ext cx="4311269" cy="5976747"/>
-          </a:xfrm>
-          <a:prstGeom prst="rect">
-            <a:avLst/>
-          </a:prstGeom>
-        </p:spPr>
-      </p:pic>
-      <p:pic>
-        <p:nvPicPr>
-          <p:cNvPr id="16" name="Picture 15">
-            <a:extLst>
-              <a:ext uri="{FF2B5EF4-FFF2-40B4-BE49-F238E27FC236}">
-                <a16:creationId xmlns:a16="http://schemas.microsoft.com/office/drawing/2014/main" id="{44DD359E-8509-974A-9218-0A9E9405C65D}"/>
-              </a:ext>
-            </a:extLst>
-          </p:cNvPr>
-          <p:cNvPicPr>
-            <a:picLocks noChangeAspect="1"/>
-          </p:cNvPicPr>
-          <p:nvPr/>
-        </p:nvPicPr>
-        <p:blipFill>
-          <a:blip r:embed="rId3"/>
-          <a:stretch>
-            <a:fillRect/>
-          </a:stretch>
-        </p:blipFill>
-        <p:spPr>
-          <a:xfrm rot="5400000">
-            <a:off x="908449" y="440626"/>
+            <a:off x="1061176" y="440626"/>
             <a:ext cx="4311269" cy="5976747"/>
           </a:xfrm>
           <a:prstGeom prst="rect">

</xml_diff>